<commit_message>
fixes to Fig. 1 from DESY comments
</commit_message>
<xml_diff>
--- a/PLTSketches.pptx
+++ b/PLTSketches.pptx
@@ -105,6 +105,11 @@
       </a:defRPr>
     </a:lvl9pPr>
   </p:defaultTextStyle>
+  <p:extLst>
+    <p:ext uri="{EFAFB233-063F-42B5-8137-9DF3F51BA10A}">
+      <p15:sldGuideLst xmlns:p15="http://schemas.microsoft.com/office/powerpoint/2012/main"/>
+    </p:ext>
+  </p:extLst>
 </p:presentation>
 </file>
 
@@ -239,7 +244,7 @@
           <a:p>
             <a:fld id="{A1BE540E-E4A8-4C12-B779-B7673EE20F96}" type="datetimeFigureOut">
               <a:rPr lang="en-US" smtClean="0"/>
-              <a:t>2/26/2021</a:t>
+              <a:t>2/10/2022</a:t>
             </a:fld>
             <a:endParaRPr lang="en-US"/>
           </a:p>
@@ -409,7 +414,7 @@
           <a:p>
             <a:fld id="{A1BE540E-E4A8-4C12-B779-B7673EE20F96}" type="datetimeFigureOut">
               <a:rPr lang="en-US" smtClean="0"/>
-              <a:t>2/26/2021</a:t>
+              <a:t>2/10/2022</a:t>
             </a:fld>
             <a:endParaRPr lang="en-US"/>
           </a:p>
@@ -589,7 +594,7 @@
           <a:p>
             <a:fld id="{A1BE540E-E4A8-4C12-B779-B7673EE20F96}" type="datetimeFigureOut">
               <a:rPr lang="en-US" smtClean="0"/>
-              <a:t>2/26/2021</a:t>
+              <a:t>2/10/2022</a:t>
             </a:fld>
             <a:endParaRPr lang="en-US"/>
           </a:p>
@@ -759,7 +764,7 @@
           <a:p>
             <a:fld id="{A1BE540E-E4A8-4C12-B779-B7673EE20F96}" type="datetimeFigureOut">
               <a:rPr lang="en-US" smtClean="0"/>
-              <a:t>2/26/2021</a:t>
+              <a:t>2/10/2022</a:t>
             </a:fld>
             <a:endParaRPr lang="en-US"/>
           </a:p>
@@ -1005,7 +1010,7 @@
           <a:p>
             <a:fld id="{A1BE540E-E4A8-4C12-B779-B7673EE20F96}" type="datetimeFigureOut">
               <a:rPr lang="en-US" smtClean="0"/>
-              <a:t>2/26/2021</a:t>
+              <a:t>2/10/2022</a:t>
             </a:fld>
             <a:endParaRPr lang="en-US"/>
           </a:p>
@@ -1237,7 +1242,7 @@
           <a:p>
             <a:fld id="{A1BE540E-E4A8-4C12-B779-B7673EE20F96}" type="datetimeFigureOut">
               <a:rPr lang="en-US" smtClean="0"/>
-              <a:t>2/26/2021</a:t>
+              <a:t>2/10/2022</a:t>
             </a:fld>
             <a:endParaRPr lang="en-US"/>
           </a:p>
@@ -1604,7 +1609,7 @@
           <a:p>
             <a:fld id="{A1BE540E-E4A8-4C12-B779-B7673EE20F96}" type="datetimeFigureOut">
               <a:rPr lang="en-US" smtClean="0"/>
-              <a:t>2/26/2021</a:t>
+              <a:t>2/10/2022</a:t>
             </a:fld>
             <a:endParaRPr lang="en-US"/>
           </a:p>
@@ -1722,7 +1727,7 @@
           <a:p>
             <a:fld id="{A1BE540E-E4A8-4C12-B779-B7673EE20F96}" type="datetimeFigureOut">
               <a:rPr lang="en-US" smtClean="0"/>
-              <a:t>2/26/2021</a:t>
+              <a:t>2/10/2022</a:t>
             </a:fld>
             <a:endParaRPr lang="en-US"/>
           </a:p>
@@ -1817,7 +1822,7 @@
           <a:p>
             <a:fld id="{A1BE540E-E4A8-4C12-B779-B7673EE20F96}" type="datetimeFigureOut">
               <a:rPr lang="en-US" smtClean="0"/>
-              <a:t>2/26/2021</a:t>
+              <a:t>2/10/2022</a:t>
             </a:fld>
             <a:endParaRPr lang="en-US"/>
           </a:p>
@@ -2094,7 +2099,7 @@
           <a:p>
             <a:fld id="{A1BE540E-E4A8-4C12-B779-B7673EE20F96}" type="datetimeFigureOut">
               <a:rPr lang="en-US" smtClean="0"/>
-              <a:t>2/26/2021</a:t>
+              <a:t>2/10/2022</a:t>
             </a:fld>
             <a:endParaRPr lang="en-US"/>
           </a:p>
@@ -2351,7 +2356,7 @@
           <a:p>
             <a:fld id="{A1BE540E-E4A8-4C12-B779-B7673EE20F96}" type="datetimeFigureOut">
               <a:rPr lang="en-US" smtClean="0"/>
-              <a:t>2/26/2021</a:t>
+              <a:t>2/10/2022</a:t>
             </a:fld>
             <a:endParaRPr lang="en-US"/>
           </a:p>
@@ -2564,7 +2569,7 @@
           <a:p>
             <a:fld id="{A1BE540E-E4A8-4C12-B779-B7673EE20F96}" type="datetimeFigureOut">
               <a:rPr lang="en-US" smtClean="0"/>
-              <a:t>2/26/2021</a:t>
+              <a:t>2/10/2022</a:t>
             </a:fld>
             <a:endParaRPr lang="en-US"/>
           </a:p>
@@ -3575,7 +3580,7 @@
             <a:p>
               <a:r>
                 <a:rPr lang="en-US" sz="1200" b="1" dirty="0"/>
-                <a:t>175 cm</a:t>
+                <a:t>175 cm</a:t>
               </a:r>
             </a:p>
           </p:txBody>
@@ -3655,7 +3660,7 @@
             <a:p>
               <a:r>
                 <a:rPr lang="en-US" sz="1200" b="1" dirty="0"/>
-                <a:t>7.5cm</a:t>
+                <a:t>7.5 cm</a:t>
               </a:r>
             </a:p>
           </p:txBody>
@@ -3780,7 +3785,7 @@
             <a:p>
               <a:r>
                 <a:rPr lang="en-US" sz="1200" b="1" dirty="0"/>
-                <a:t>8mm</a:t>
+                <a:t>8 mm</a:t>
               </a:r>
             </a:p>
           </p:txBody>
@@ -3815,7 +3820,7 @@
             <a:p>
               <a:r>
                 <a:rPr lang="en-US" sz="1200" b="1" dirty="0"/>
-                <a:t>8mm</a:t>
+                <a:t>8 mm</a:t>
               </a:r>
             </a:p>
           </p:txBody>
@@ -3879,7 +3884,7 @@
           </p:nvSpPr>
           <p:spPr>
             <a:xfrm>
-              <a:off x="3488434" y="1971597"/>
+              <a:off x="3461272" y="1971597"/>
               <a:ext cx="903703" cy="276999"/>
             </a:xfrm>
             <a:prstGeom prst="rect">
@@ -3895,7 +3900,7 @@
             <a:p>
               <a:r>
                 <a:rPr lang="en-US" sz="1200" b="1" dirty="0"/>
-                <a:t>4.45cm</a:t>
+                <a:t>4.45 cm</a:t>
               </a:r>
             </a:p>
           </p:txBody>

</xml_diff>

<commit_message>
rebuild Fig. 2 to make the green line clearer (and also so it's not quite such a duplicate of Fig. 1)
</commit_message>
<xml_diff>
--- a/PLTSketches.pptx
+++ b/PLTSketches.pptx
@@ -1,20 +1,116 @@
 
 <file path=ppt/presentation.xml><?xml version="1.0" encoding="utf-8"?>
-<p:presentation xmlns:a="http://schemas.openxmlformats.org/drawingml/2006/main" xmlns:p="http://schemas.openxmlformats.org/presentationml/2006/main" xmlns:r="http://schemas.openxmlformats.org/officeDocument/2006/relationships" xmlns:p14="http://schemas.microsoft.com/office/powerpoint/2010/main" xmlns:p15="http://schemas.microsoft.com/office/powerpoint/2012/main" xmlns:mc="http://schemas.openxmlformats.org/markup-compatibility/2006">
+<p:presentation xmlns:a="http://schemas.openxmlformats.org/drawingml/2006/main" xmlns:r="http://schemas.openxmlformats.org/officeDocument/2006/relationships" xmlns:p="http://schemas.openxmlformats.org/presentationml/2006/main">
   <p:sldMasterIdLst>
-    <p:sldMasterId id="2147483648" r:id="rId2"/>
+    <p:sldMasterId id="2147483648" r:id="rId1"/>
   </p:sldMasterIdLst>
   <p:sldIdLst>
-    <p:sldId id="256" r:id="rId3"/>
-    <p:sldId id="257" r:id="rId4"/>
+    <p:sldId id="256" r:id="rId2"/>
+    <p:sldId id="257" r:id="rId3"/>
+    <p:sldId id="258" r:id="rId4"/>
   </p:sldIdLst>
   <p:sldSz cx="3565525" cy="2193925"/>
-  <p:notesSz cx="7772400" cy="10058400"/>
+  <p:notesSz cx="7315200" cy="9601200"/>
+  <p:defaultTextStyle>
+    <a:defPPr>
+      <a:defRPr lang="en-US"/>
+    </a:defPPr>
+    <a:lvl1pPr marL="0" algn="l" defTabSz="914400" rtl="0" eaLnBrk="1" latinLnBrk="0" hangingPunct="1">
+      <a:defRPr sz="1800" kern="1200">
+        <a:solidFill>
+          <a:schemeClr val="tx1"/>
+        </a:solidFill>
+        <a:latin typeface="+mn-lt"/>
+        <a:ea typeface="+mn-ea"/>
+        <a:cs typeface="+mn-cs"/>
+      </a:defRPr>
+    </a:lvl1pPr>
+    <a:lvl2pPr marL="457200" algn="l" defTabSz="914400" rtl="0" eaLnBrk="1" latinLnBrk="0" hangingPunct="1">
+      <a:defRPr sz="1800" kern="1200">
+        <a:solidFill>
+          <a:schemeClr val="tx1"/>
+        </a:solidFill>
+        <a:latin typeface="+mn-lt"/>
+        <a:ea typeface="+mn-ea"/>
+        <a:cs typeface="+mn-cs"/>
+      </a:defRPr>
+    </a:lvl2pPr>
+    <a:lvl3pPr marL="914400" algn="l" defTabSz="914400" rtl="0" eaLnBrk="1" latinLnBrk="0" hangingPunct="1">
+      <a:defRPr sz="1800" kern="1200">
+        <a:solidFill>
+          <a:schemeClr val="tx1"/>
+        </a:solidFill>
+        <a:latin typeface="+mn-lt"/>
+        <a:ea typeface="+mn-ea"/>
+        <a:cs typeface="+mn-cs"/>
+      </a:defRPr>
+    </a:lvl3pPr>
+    <a:lvl4pPr marL="1371600" algn="l" defTabSz="914400" rtl="0" eaLnBrk="1" latinLnBrk="0" hangingPunct="1">
+      <a:defRPr sz="1800" kern="1200">
+        <a:solidFill>
+          <a:schemeClr val="tx1"/>
+        </a:solidFill>
+        <a:latin typeface="+mn-lt"/>
+        <a:ea typeface="+mn-ea"/>
+        <a:cs typeface="+mn-cs"/>
+      </a:defRPr>
+    </a:lvl4pPr>
+    <a:lvl5pPr marL="1828800" algn="l" defTabSz="914400" rtl="0" eaLnBrk="1" latinLnBrk="0" hangingPunct="1">
+      <a:defRPr sz="1800" kern="1200">
+        <a:solidFill>
+          <a:schemeClr val="tx1"/>
+        </a:solidFill>
+        <a:latin typeface="+mn-lt"/>
+        <a:ea typeface="+mn-ea"/>
+        <a:cs typeface="+mn-cs"/>
+      </a:defRPr>
+    </a:lvl5pPr>
+    <a:lvl6pPr marL="2286000" algn="l" defTabSz="914400" rtl="0" eaLnBrk="1" latinLnBrk="0" hangingPunct="1">
+      <a:defRPr sz="1800" kern="1200">
+        <a:solidFill>
+          <a:schemeClr val="tx1"/>
+        </a:solidFill>
+        <a:latin typeface="+mn-lt"/>
+        <a:ea typeface="+mn-ea"/>
+        <a:cs typeface="+mn-cs"/>
+      </a:defRPr>
+    </a:lvl6pPr>
+    <a:lvl7pPr marL="2743200" algn="l" defTabSz="914400" rtl="0" eaLnBrk="1" latinLnBrk="0" hangingPunct="1">
+      <a:defRPr sz="1800" kern="1200">
+        <a:solidFill>
+          <a:schemeClr val="tx1"/>
+        </a:solidFill>
+        <a:latin typeface="+mn-lt"/>
+        <a:ea typeface="+mn-ea"/>
+        <a:cs typeface="+mn-cs"/>
+      </a:defRPr>
+    </a:lvl7pPr>
+    <a:lvl8pPr marL="3200400" algn="l" defTabSz="914400" rtl="0" eaLnBrk="1" latinLnBrk="0" hangingPunct="1">
+      <a:defRPr sz="1800" kern="1200">
+        <a:solidFill>
+          <a:schemeClr val="tx1"/>
+        </a:solidFill>
+        <a:latin typeface="+mn-lt"/>
+        <a:ea typeface="+mn-ea"/>
+        <a:cs typeface="+mn-cs"/>
+      </a:defRPr>
+    </a:lvl8pPr>
+    <a:lvl9pPr marL="3657600" algn="l" defTabSz="914400" rtl="0" eaLnBrk="1" latinLnBrk="0" hangingPunct="1">
+      <a:defRPr sz="1800" kern="1200">
+        <a:solidFill>
+          <a:schemeClr val="tx1"/>
+        </a:solidFill>
+        <a:latin typeface="+mn-lt"/>
+        <a:ea typeface="+mn-ea"/>
+        <a:cs typeface="+mn-cs"/>
+      </a:defRPr>
+    </a:lvl9pPr>
+  </p:defaultTextStyle>
 </p:presentation>
 </file>
 
 <file path=ppt/slideLayouts/slideLayout1.xml><?xml version="1.0" encoding="utf-8"?>
-<p:sldLayout xmlns:a="http://schemas.openxmlformats.org/drawingml/2006/main" xmlns:p="http://schemas.openxmlformats.org/presentationml/2006/main" xmlns:r="http://schemas.openxmlformats.org/officeDocument/2006/relationships" xmlns:p14="http://schemas.microsoft.com/office/powerpoint/2010/main" xmlns:p15="http://schemas.microsoft.com/office/powerpoint/2012/main" xmlns:mc="http://schemas.openxmlformats.org/markup-compatibility/2006" type="blank" preserve="1">
+<p:sldLayout xmlns:a="http://schemas.openxmlformats.org/drawingml/2006/main" xmlns:r="http://schemas.openxmlformats.org/officeDocument/2006/relationships" xmlns:p="http://schemas.openxmlformats.org/presentationml/2006/main" type="blank" preserve="1">
   <p:cSld name="Blank Slide">
     <p:spTree>
       <p:nvGrpSpPr>
@@ -43,6 +139,7 @@
         <p:spPr/>
         <p:txBody>
           <a:bodyPr/>
+          <a:lstStyle/>
           <a:p>
             <a:r>
               <a:t>Footer</a:t>
@@ -63,10 +160,12 @@
         <p:spPr/>
         <p:txBody>
           <a:bodyPr/>
+          <a:lstStyle/>
           <a:p>
             <a:fld id="{27CA978B-85E5-499C-B143-0D84E7719123}" type="slidenum">
-              <a:t>&lt;#&gt;</a:t>
+              <a:t>‹#›</a:t>
             </a:fld>
+            <a:endParaRPr/>
           </a:p>
         </p:txBody>
       </p:sp>
@@ -83,21 +182,22 @@
         <p:spPr/>
         <p:txBody>
           <a:bodyPr/>
-          <a:p>
-            <a:r>
-              <a:rPr lang="en-US"/>
-              <a:t/>
-            </a:r>
+          <a:lstStyle/>
+          <a:p>
+            <a:endParaRPr/>
           </a:p>
         </p:txBody>
       </p:sp>
     </p:spTree>
   </p:cSld>
+  <p:clrMapOvr>
+    <a:masterClrMapping/>
+  </p:clrMapOvr>
 </p:sldLayout>
 </file>
 
 <file path=ppt/slideLayouts/slideLayout10.xml><?xml version="1.0" encoding="utf-8"?>
-<p:sldLayout xmlns:a="http://schemas.openxmlformats.org/drawingml/2006/main" xmlns:p="http://schemas.openxmlformats.org/presentationml/2006/main" xmlns:r="http://schemas.openxmlformats.org/officeDocument/2006/relationships" xmlns:p14="http://schemas.microsoft.com/office/powerpoint/2010/main" xmlns:p15="http://schemas.microsoft.com/office/powerpoint/2012/main" xmlns:mc="http://schemas.openxmlformats.org/markup-compatibility/2006" type="objOverTx" preserve="1">
+<p:sldLayout xmlns:a="http://schemas.openxmlformats.org/drawingml/2006/main" xmlns:r="http://schemas.openxmlformats.org/officeDocument/2006/relationships" xmlns:p="http://schemas.openxmlformats.org/presentationml/2006/main" type="objOverTx" preserve="1">
   <p:cSld name="Title, Content over Content">
     <p:spTree>
       <p:nvGrpSpPr>
@@ -137,11 +237,12 @@
           </a:ln>
         </p:spPr>
         <p:txBody>
-          <a:bodyPr lIns="0" rIns="0" tIns="0" bIns="0" anchor="ctr">
+          <a:bodyPr lIns="0" tIns="0" rIns="0" bIns="0" anchor="ctr">
             <a:noAutofit/>
           </a:bodyPr>
-          <a:p>
-            <a:endParaRPr b="0" lang="en-US" sz="1800" spc="-1" strike="noStrike">
+          <a:lstStyle/>
+          <a:p>
+            <a:endParaRPr lang="en-US" sz="1800" b="0" strike="noStrike" spc="-1">
               <a:solidFill>
                 <a:srgbClr val="000000"/>
               </a:solidFill>
@@ -174,9 +275,10 @@
           </a:ln>
         </p:spPr>
         <p:txBody>
-          <a:bodyPr lIns="0" rIns="0" tIns="0" bIns="0" anchor="t">
+          <a:bodyPr lIns="0" tIns="0" rIns="0" bIns="0" anchor="t">
             <a:normAutofit/>
           </a:bodyPr>
+          <a:lstStyle/>
           <a:p>
             <a:pPr>
               <a:lnSpc>
@@ -187,7 +289,7 @@
               </a:spcBef>
               <a:buNone/>
             </a:pPr>
-            <a:endParaRPr b="0" lang="en-US" sz="820" spc="-1" strike="noStrike">
+            <a:endParaRPr lang="en-US" sz="820" b="0" strike="noStrike" spc="-1">
               <a:solidFill>
                 <a:srgbClr val="000000"/>
               </a:solidFill>
@@ -220,9 +322,10 @@
           </a:ln>
         </p:spPr>
         <p:txBody>
-          <a:bodyPr lIns="0" rIns="0" tIns="0" bIns="0" anchor="t">
+          <a:bodyPr lIns="0" tIns="0" rIns="0" bIns="0" anchor="t">
             <a:normAutofit/>
           </a:bodyPr>
+          <a:lstStyle/>
           <a:p>
             <a:pPr>
               <a:lnSpc>
@@ -233,7 +336,7 @@
               </a:spcBef>
               <a:buNone/>
             </a:pPr>
-            <a:endParaRPr b="0" lang="en-US" sz="820" spc="-1" strike="noStrike">
+            <a:endParaRPr lang="en-US" sz="820" b="0" strike="noStrike" spc="-1">
               <a:solidFill>
                 <a:srgbClr val="000000"/>
               </a:solidFill>
@@ -255,6 +358,7 @@
         <p:spPr/>
         <p:txBody>
           <a:bodyPr/>
+          <a:lstStyle/>
           <a:p>
             <a:r>
               <a:t>Footer</a:t>
@@ -275,10 +379,12 @@
         <p:spPr/>
         <p:txBody>
           <a:bodyPr/>
+          <a:lstStyle/>
           <a:p>
             <a:fld id="{411942B7-2B5C-4DB1-973F-E6FD083B341D}" type="slidenum">
-              <a:t>&lt;#&gt;</a:t>
+              <a:t>‹#›</a:t>
             </a:fld>
+            <a:endParaRPr/>
           </a:p>
         </p:txBody>
       </p:sp>
@@ -295,21 +401,22 @@
         <p:spPr/>
         <p:txBody>
           <a:bodyPr/>
-          <a:p>
-            <a:r>
-              <a:rPr lang="en-US"/>
-              <a:t/>
-            </a:r>
+          <a:lstStyle/>
+          <a:p>
+            <a:endParaRPr/>
           </a:p>
         </p:txBody>
       </p:sp>
     </p:spTree>
   </p:cSld>
+  <p:clrMapOvr>
+    <a:masterClrMapping/>
+  </p:clrMapOvr>
 </p:sldLayout>
 </file>
 
 <file path=ppt/slideLayouts/slideLayout11.xml><?xml version="1.0" encoding="utf-8"?>
-<p:sldLayout xmlns:a="http://schemas.openxmlformats.org/drawingml/2006/main" xmlns:p="http://schemas.openxmlformats.org/presentationml/2006/main" xmlns:r="http://schemas.openxmlformats.org/officeDocument/2006/relationships" xmlns:p14="http://schemas.microsoft.com/office/powerpoint/2010/main" xmlns:p15="http://schemas.microsoft.com/office/powerpoint/2012/main" xmlns:mc="http://schemas.openxmlformats.org/markup-compatibility/2006" type="fourObj" preserve="1">
+<p:sldLayout xmlns:a="http://schemas.openxmlformats.org/drawingml/2006/main" xmlns:r="http://schemas.openxmlformats.org/officeDocument/2006/relationships" xmlns:p="http://schemas.openxmlformats.org/presentationml/2006/main" type="fourObj" preserve="1">
   <p:cSld name="Title, 4 Content">
     <p:spTree>
       <p:nvGrpSpPr>
@@ -349,11 +456,12 @@
           </a:ln>
         </p:spPr>
         <p:txBody>
-          <a:bodyPr lIns="0" rIns="0" tIns="0" bIns="0" anchor="ctr">
+          <a:bodyPr lIns="0" tIns="0" rIns="0" bIns="0" anchor="ctr">
             <a:noAutofit/>
           </a:bodyPr>
-          <a:p>
-            <a:endParaRPr b="0" lang="en-US" sz="1800" spc="-1" strike="noStrike">
+          <a:lstStyle/>
+          <a:p>
+            <a:endParaRPr lang="en-US" sz="1800" b="0" strike="noStrike" spc="-1">
               <a:solidFill>
                 <a:srgbClr val="000000"/>
               </a:solidFill>
@@ -386,9 +494,10 @@
           </a:ln>
         </p:spPr>
         <p:txBody>
-          <a:bodyPr lIns="0" rIns="0" tIns="0" bIns="0" anchor="t">
+          <a:bodyPr lIns="0" tIns="0" rIns="0" bIns="0" anchor="t">
             <a:normAutofit/>
           </a:bodyPr>
+          <a:lstStyle/>
           <a:p>
             <a:pPr>
               <a:lnSpc>
@@ -399,7 +508,7 @@
               </a:spcBef>
               <a:buNone/>
             </a:pPr>
-            <a:endParaRPr b="0" lang="en-US" sz="820" spc="-1" strike="noStrike">
+            <a:endParaRPr lang="en-US" sz="820" b="0" strike="noStrike" spc="-1">
               <a:solidFill>
                 <a:srgbClr val="000000"/>
               </a:solidFill>
@@ -432,9 +541,10 @@
           </a:ln>
         </p:spPr>
         <p:txBody>
-          <a:bodyPr lIns="0" rIns="0" tIns="0" bIns="0" anchor="t">
+          <a:bodyPr lIns="0" tIns="0" rIns="0" bIns="0" anchor="t">
             <a:normAutofit/>
           </a:bodyPr>
+          <a:lstStyle/>
           <a:p>
             <a:pPr>
               <a:lnSpc>
@@ -445,7 +555,7 @@
               </a:spcBef>
               <a:buNone/>
             </a:pPr>
-            <a:endParaRPr b="0" lang="en-US" sz="820" spc="-1" strike="noStrike">
+            <a:endParaRPr lang="en-US" sz="820" b="0" strike="noStrike" spc="-1">
               <a:solidFill>
                 <a:srgbClr val="000000"/>
               </a:solidFill>
@@ -478,9 +588,10 @@
           </a:ln>
         </p:spPr>
         <p:txBody>
-          <a:bodyPr lIns="0" rIns="0" tIns="0" bIns="0" anchor="t">
+          <a:bodyPr lIns="0" tIns="0" rIns="0" bIns="0" anchor="t">
             <a:normAutofit/>
           </a:bodyPr>
+          <a:lstStyle/>
           <a:p>
             <a:pPr>
               <a:lnSpc>
@@ -491,7 +602,7 @@
               </a:spcBef>
               <a:buNone/>
             </a:pPr>
-            <a:endParaRPr b="0" lang="en-US" sz="820" spc="-1" strike="noStrike">
+            <a:endParaRPr lang="en-US" sz="820" b="0" strike="noStrike" spc="-1">
               <a:solidFill>
                 <a:srgbClr val="000000"/>
               </a:solidFill>
@@ -524,9 +635,10 @@
           </a:ln>
         </p:spPr>
         <p:txBody>
-          <a:bodyPr lIns="0" rIns="0" tIns="0" bIns="0" anchor="t">
+          <a:bodyPr lIns="0" tIns="0" rIns="0" bIns="0" anchor="t">
             <a:normAutofit/>
           </a:bodyPr>
+          <a:lstStyle/>
           <a:p>
             <a:pPr>
               <a:lnSpc>
@@ -537,7 +649,7 @@
               </a:spcBef>
               <a:buNone/>
             </a:pPr>
-            <a:endParaRPr b="0" lang="en-US" sz="820" spc="-1" strike="noStrike">
+            <a:endParaRPr lang="en-US" sz="820" b="0" strike="noStrike" spc="-1">
               <a:solidFill>
                 <a:srgbClr val="000000"/>
               </a:solidFill>
@@ -559,6 +671,7 @@
         <p:spPr/>
         <p:txBody>
           <a:bodyPr/>
+          <a:lstStyle/>
           <a:p>
             <a:r>
               <a:t>Footer</a:t>
@@ -579,10 +692,12 @@
         <p:spPr/>
         <p:txBody>
           <a:bodyPr/>
+          <a:lstStyle/>
           <a:p>
             <a:fld id="{C23BB220-DE56-4DA3-969C-AAA9BB6EDA30}" type="slidenum">
-              <a:t>&lt;#&gt;</a:t>
+              <a:t>‹#›</a:t>
             </a:fld>
+            <a:endParaRPr/>
           </a:p>
         </p:txBody>
       </p:sp>
@@ -599,21 +714,22 @@
         <p:spPr/>
         <p:txBody>
           <a:bodyPr/>
-          <a:p>
-            <a:r>
-              <a:rPr lang="en-US"/>
-              <a:t/>
-            </a:r>
+          <a:lstStyle/>
+          <a:p>
+            <a:endParaRPr/>
           </a:p>
         </p:txBody>
       </p:sp>
     </p:spTree>
   </p:cSld>
+  <p:clrMapOvr>
+    <a:masterClrMapping/>
+  </p:clrMapOvr>
 </p:sldLayout>
 </file>
 
 <file path=ppt/slideLayouts/slideLayout12.xml><?xml version="1.0" encoding="utf-8"?>
-<p:sldLayout xmlns:a="http://schemas.openxmlformats.org/drawingml/2006/main" xmlns:p="http://schemas.openxmlformats.org/presentationml/2006/main" xmlns:r="http://schemas.openxmlformats.org/officeDocument/2006/relationships" xmlns:p14="http://schemas.microsoft.com/office/powerpoint/2010/main" xmlns:p15="http://schemas.microsoft.com/office/powerpoint/2012/main" xmlns:mc="http://schemas.openxmlformats.org/markup-compatibility/2006" type="blank" preserve="1">
+<p:sldLayout xmlns:a="http://schemas.openxmlformats.org/drawingml/2006/main" xmlns:r="http://schemas.openxmlformats.org/officeDocument/2006/relationships" xmlns:p="http://schemas.openxmlformats.org/presentationml/2006/main" type="blank" preserve="1">
   <p:cSld name="Title, 6 Content">
     <p:spTree>
       <p:nvGrpSpPr>
@@ -653,11 +769,12 @@
           </a:ln>
         </p:spPr>
         <p:txBody>
-          <a:bodyPr lIns="0" rIns="0" tIns="0" bIns="0" anchor="ctr">
+          <a:bodyPr lIns="0" tIns="0" rIns="0" bIns="0" anchor="ctr">
             <a:noAutofit/>
           </a:bodyPr>
-          <a:p>
-            <a:endParaRPr b="0" lang="en-US" sz="1800" spc="-1" strike="noStrike">
+          <a:lstStyle/>
+          <a:p>
+            <a:endParaRPr lang="en-US" sz="1800" b="0" strike="noStrike" spc="-1">
               <a:solidFill>
                 <a:srgbClr val="000000"/>
               </a:solidFill>
@@ -690,9 +807,10 @@
           </a:ln>
         </p:spPr>
         <p:txBody>
-          <a:bodyPr lIns="0" rIns="0" tIns="0" bIns="0" anchor="t">
+          <a:bodyPr lIns="0" tIns="0" rIns="0" bIns="0" anchor="t">
             <a:normAutofit/>
           </a:bodyPr>
+          <a:lstStyle/>
           <a:p>
             <a:pPr>
               <a:lnSpc>
@@ -703,7 +821,7 @@
               </a:spcBef>
               <a:buNone/>
             </a:pPr>
-            <a:endParaRPr b="0" lang="en-US" sz="820" spc="-1" strike="noStrike">
+            <a:endParaRPr lang="en-US" sz="820" b="0" strike="noStrike" spc="-1">
               <a:solidFill>
                 <a:srgbClr val="000000"/>
               </a:solidFill>
@@ -736,9 +854,10 @@
           </a:ln>
         </p:spPr>
         <p:txBody>
-          <a:bodyPr lIns="0" rIns="0" tIns="0" bIns="0" anchor="t">
+          <a:bodyPr lIns="0" tIns="0" rIns="0" bIns="0" anchor="t">
             <a:normAutofit/>
           </a:bodyPr>
+          <a:lstStyle/>
           <a:p>
             <a:pPr>
               <a:lnSpc>
@@ -749,7 +868,7 @@
               </a:spcBef>
               <a:buNone/>
             </a:pPr>
-            <a:endParaRPr b="0" lang="en-US" sz="820" spc="-1" strike="noStrike">
+            <a:endParaRPr lang="en-US" sz="820" b="0" strike="noStrike" spc="-1">
               <a:solidFill>
                 <a:srgbClr val="000000"/>
               </a:solidFill>
@@ -782,9 +901,10 @@
           </a:ln>
         </p:spPr>
         <p:txBody>
-          <a:bodyPr lIns="0" rIns="0" tIns="0" bIns="0" anchor="t">
+          <a:bodyPr lIns="0" tIns="0" rIns="0" bIns="0" anchor="t">
             <a:normAutofit/>
           </a:bodyPr>
+          <a:lstStyle/>
           <a:p>
             <a:pPr>
               <a:lnSpc>
@@ -795,7 +915,7 @@
               </a:spcBef>
               <a:buNone/>
             </a:pPr>
-            <a:endParaRPr b="0" lang="en-US" sz="820" spc="-1" strike="noStrike">
+            <a:endParaRPr lang="en-US" sz="820" b="0" strike="noStrike" spc="-1">
               <a:solidFill>
                 <a:srgbClr val="000000"/>
               </a:solidFill>
@@ -828,9 +948,10 @@
           </a:ln>
         </p:spPr>
         <p:txBody>
-          <a:bodyPr lIns="0" rIns="0" tIns="0" bIns="0" anchor="t">
+          <a:bodyPr lIns="0" tIns="0" rIns="0" bIns="0" anchor="t">
             <a:normAutofit/>
           </a:bodyPr>
+          <a:lstStyle/>
           <a:p>
             <a:pPr>
               <a:lnSpc>
@@ -841,7 +962,7 @@
               </a:spcBef>
               <a:buNone/>
             </a:pPr>
-            <a:endParaRPr b="0" lang="en-US" sz="820" spc="-1" strike="noStrike">
+            <a:endParaRPr lang="en-US" sz="820" b="0" strike="noStrike" spc="-1">
               <a:solidFill>
                 <a:srgbClr val="000000"/>
               </a:solidFill>
@@ -874,9 +995,10 @@
           </a:ln>
         </p:spPr>
         <p:txBody>
-          <a:bodyPr lIns="0" rIns="0" tIns="0" bIns="0" anchor="t">
+          <a:bodyPr lIns="0" tIns="0" rIns="0" bIns="0" anchor="t">
             <a:normAutofit/>
           </a:bodyPr>
+          <a:lstStyle/>
           <a:p>
             <a:pPr>
               <a:lnSpc>
@@ -887,7 +1009,7 @@
               </a:spcBef>
               <a:buNone/>
             </a:pPr>
-            <a:endParaRPr b="0" lang="en-US" sz="820" spc="-1" strike="noStrike">
+            <a:endParaRPr lang="en-US" sz="820" b="0" strike="noStrike" spc="-1">
               <a:solidFill>
                 <a:srgbClr val="000000"/>
               </a:solidFill>
@@ -920,9 +1042,10 @@
           </a:ln>
         </p:spPr>
         <p:txBody>
-          <a:bodyPr lIns="0" rIns="0" tIns="0" bIns="0" anchor="t">
+          <a:bodyPr lIns="0" tIns="0" rIns="0" bIns="0" anchor="t">
             <a:normAutofit/>
           </a:bodyPr>
+          <a:lstStyle/>
           <a:p>
             <a:pPr>
               <a:lnSpc>
@@ -933,7 +1056,7 @@
               </a:spcBef>
               <a:buNone/>
             </a:pPr>
-            <a:endParaRPr b="0" lang="en-US" sz="820" spc="-1" strike="noStrike">
+            <a:endParaRPr lang="en-US" sz="820" b="0" strike="noStrike" spc="-1">
               <a:solidFill>
                 <a:srgbClr val="000000"/>
               </a:solidFill>
@@ -955,6 +1078,7 @@
         <p:spPr/>
         <p:txBody>
           <a:bodyPr/>
+          <a:lstStyle/>
           <a:p>
             <a:r>
               <a:t>Footer</a:t>
@@ -975,10 +1099,12 @@
         <p:spPr/>
         <p:txBody>
           <a:bodyPr/>
+          <a:lstStyle/>
           <a:p>
             <a:fld id="{EDF8A452-6713-4FF4-A9F3-07471CB1916B}" type="slidenum">
-              <a:t>&lt;#&gt;</a:t>
+              <a:t>‹#›</a:t>
             </a:fld>
+            <a:endParaRPr/>
           </a:p>
         </p:txBody>
       </p:sp>
@@ -995,21 +1121,22 @@
         <p:spPr/>
         <p:txBody>
           <a:bodyPr/>
-          <a:p>
-            <a:r>
-              <a:rPr lang="en-US"/>
-              <a:t/>
-            </a:r>
+          <a:lstStyle/>
+          <a:p>
+            <a:endParaRPr/>
           </a:p>
         </p:txBody>
       </p:sp>
     </p:spTree>
   </p:cSld>
+  <p:clrMapOvr>
+    <a:masterClrMapping/>
+  </p:clrMapOvr>
 </p:sldLayout>
 </file>
 
 <file path=ppt/slideLayouts/slideLayout2.xml><?xml version="1.0" encoding="utf-8"?>
-<p:sldLayout xmlns:a="http://schemas.openxmlformats.org/drawingml/2006/main" xmlns:p="http://schemas.openxmlformats.org/presentationml/2006/main" xmlns:r="http://schemas.openxmlformats.org/officeDocument/2006/relationships" xmlns:p14="http://schemas.microsoft.com/office/powerpoint/2010/main" xmlns:p15="http://schemas.microsoft.com/office/powerpoint/2012/main" xmlns:mc="http://schemas.openxmlformats.org/markup-compatibility/2006" type="tx" preserve="1">
+<p:sldLayout xmlns:a="http://schemas.openxmlformats.org/drawingml/2006/main" xmlns:r="http://schemas.openxmlformats.org/officeDocument/2006/relationships" xmlns:p="http://schemas.openxmlformats.org/presentationml/2006/main" type="tx" preserve="1">
   <p:cSld name="Title Slide">
     <p:spTree>
       <p:nvGrpSpPr>
@@ -1049,11 +1176,12 @@
           </a:ln>
         </p:spPr>
         <p:txBody>
-          <a:bodyPr lIns="0" rIns="0" tIns="0" bIns="0" anchor="ctr">
+          <a:bodyPr lIns="0" tIns="0" rIns="0" bIns="0" anchor="ctr">
             <a:noAutofit/>
           </a:bodyPr>
-          <a:p>
-            <a:endParaRPr b="0" lang="en-US" sz="1800" spc="-1" strike="noStrike">
+          <a:lstStyle/>
+          <a:p>
+            <a:endParaRPr lang="en-US" sz="1800" b="0" strike="noStrike" spc="-1">
               <a:solidFill>
                 <a:srgbClr val="000000"/>
               </a:solidFill>
@@ -1086,14 +1214,15 @@
           </a:ln>
         </p:spPr>
         <p:txBody>
-          <a:bodyPr lIns="0" rIns="0" tIns="0" bIns="0" anchor="ctr">
+          <a:bodyPr lIns="0" tIns="0" rIns="0" bIns="0" anchor="ctr">
             <a:noAutofit/>
           </a:bodyPr>
+          <a:lstStyle/>
           <a:p>
             <a:pPr algn="ctr">
               <a:buNone/>
             </a:pPr>
-            <a:endParaRPr b="0" lang="en-US" sz="3200" spc="-1" strike="noStrike">
+            <a:endParaRPr lang="en-US" sz="3200" b="0" strike="noStrike" spc="-1">
               <a:latin typeface="Arial"/>
             </a:endParaRPr>
           </a:p>
@@ -1112,6 +1241,7 @@
         <p:spPr/>
         <p:txBody>
           <a:bodyPr/>
+          <a:lstStyle/>
           <a:p>
             <a:r>
               <a:t>Footer</a:t>
@@ -1121,7 +1251,7 @@
       </p:sp>
       <p:sp>
         <p:nvSpPr>
-          <p:cNvPr id="5" name="PlaceHolder 4"/>
+          <p:cNvPr id="2" name="PlaceHolder 4"/>
           <p:cNvSpPr>
             <a:spLocks noGrp="1"/>
           </p:cNvSpPr>
@@ -1132,16 +1262,18 @@
         <p:spPr/>
         <p:txBody>
           <a:bodyPr/>
+          <a:lstStyle/>
           <a:p>
             <a:fld id="{632D3A4E-5081-42C0-8368-606A5AB70809}" type="slidenum">
-              <a:t>&lt;#&gt;</a:t>
+              <a:t>‹#›</a:t>
             </a:fld>
-          </a:p>
-        </p:txBody>
-      </p:sp>
-      <p:sp>
-        <p:nvSpPr>
-          <p:cNvPr id="6" name="PlaceHolder 5"/>
+            <a:endParaRPr/>
+          </a:p>
+        </p:txBody>
+      </p:sp>
+      <p:sp>
+        <p:nvSpPr>
+          <p:cNvPr id="3" name="PlaceHolder 5"/>
           <p:cNvSpPr>
             <a:spLocks noGrp="1"/>
           </p:cNvSpPr>
@@ -1152,21 +1284,22 @@
         <p:spPr/>
         <p:txBody>
           <a:bodyPr/>
-          <a:p>
-            <a:r>
-              <a:rPr lang="en-US"/>
-              <a:t/>
-            </a:r>
+          <a:lstStyle/>
+          <a:p>
+            <a:endParaRPr/>
           </a:p>
         </p:txBody>
       </p:sp>
     </p:spTree>
   </p:cSld>
+  <p:clrMapOvr>
+    <a:masterClrMapping/>
+  </p:clrMapOvr>
 </p:sldLayout>
 </file>
 
 <file path=ppt/slideLayouts/slideLayout3.xml><?xml version="1.0" encoding="utf-8"?>
-<p:sldLayout xmlns:a="http://schemas.openxmlformats.org/drawingml/2006/main" xmlns:p="http://schemas.openxmlformats.org/presentationml/2006/main" xmlns:r="http://schemas.openxmlformats.org/officeDocument/2006/relationships" xmlns:p14="http://schemas.microsoft.com/office/powerpoint/2010/main" xmlns:p15="http://schemas.microsoft.com/office/powerpoint/2012/main" xmlns:mc="http://schemas.openxmlformats.org/markup-compatibility/2006" type="obj" preserve="1">
+<p:sldLayout xmlns:a="http://schemas.openxmlformats.org/drawingml/2006/main" xmlns:r="http://schemas.openxmlformats.org/officeDocument/2006/relationships" xmlns:p="http://schemas.openxmlformats.org/presentationml/2006/main" type="obj" preserve="1">
   <p:cSld name="Title, Content">
     <p:spTree>
       <p:nvGrpSpPr>
@@ -1206,11 +1339,12 @@
           </a:ln>
         </p:spPr>
         <p:txBody>
-          <a:bodyPr lIns="0" rIns="0" tIns="0" bIns="0" anchor="ctr">
+          <a:bodyPr lIns="0" tIns="0" rIns="0" bIns="0" anchor="ctr">
             <a:noAutofit/>
           </a:bodyPr>
-          <a:p>
-            <a:endParaRPr b="0" lang="en-US" sz="1800" spc="-1" strike="noStrike">
+          <a:lstStyle/>
+          <a:p>
+            <a:endParaRPr lang="en-US" sz="1800" b="0" strike="noStrike" spc="-1">
               <a:solidFill>
                 <a:srgbClr val="000000"/>
               </a:solidFill>
@@ -1243,9 +1377,10 @@
           </a:ln>
         </p:spPr>
         <p:txBody>
-          <a:bodyPr lIns="0" rIns="0" tIns="0" bIns="0" anchor="t">
+          <a:bodyPr lIns="0" tIns="0" rIns="0" bIns="0" anchor="t">
             <a:normAutofit/>
           </a:bodyPr>
+          <a:lstStyle/>
           <a:p>
             <a:pPr>
               <a:lnSpc>
@@ -1256,7 +1391,7 @@
               </a:spcBef>
               <a:buNone/>
             </a:pPr>
-            <a:endParaRPr b="0" lang="en-US" sz="820" spc="-1" strike="noStrike">
+            <a:endParaRPr lang="en-US" sz="820" b="0" strike="noStrike" spc="-1">
               <a:solidFill>
                 <a:srgbClr val="000000"/>
               </a:solidFill>
@@ -1278,6 +1413,7 @@
         <p:spPr/>
         <p:txBody>
           <a:bodyPr/>
+          <a:lstStyle/>
           <a:p>
             <a:r>
               <a:t>Footer</a:t>
@@ -1298,10 +1434,12 @@
         <p:spPr/>
         <p:txBody>
           <a:bodyPr/>
+          <a:lstStyle/>
           <a:p>
             <a:fld id="{09692BF2-B2FC-42F6-9672-9185F6EA2787}" type="slidenum">
-              <a:t>&lt;#&gt;</a:t>
+              <a:t>‹#›</a:t>
             </a:fld>
+            <a:endParaRPr/>
           </a:p>
         </p:txBody>
       </p:sp>
@@ -1318,21 +1456,22 @@
         <p:spPr/>
         <p:txBody>
           <a:bodyPr/>
-          <a:p>
-            <a:r>
-              <a:rPr lang="en-US"/>
-              <a:t/>
-            </a:r>
+          <a:lstStyle/>
+          <a:p>
+            <a:endParaRPr/>
           </a:p>
         </p:txBody>
       </p:sp>
     </p:spTree>
   </p:cSld>
+  <p:clrMapOvr>
+    <a:masterClrMapping/>
+  </p:clrMapOvr>
 </p:sldLayout>
 </file>
 
 <file path=ppt/slideLayouts/slideLayout4.xml><?xml version="1.0" encoding="utf-8"?>
-<p:sldLayout xmlns:a="http://schemas.openxmlformats.org/drawingml/2006/main" xmlns:p="http://schemas.openxmlformats.org/presentationml/2006/main" xmlns:r="http://schemas.openxmlformats.org/officeDocument/2006/relationships" xmlns:p14="http://schemas.microsoft.com/office/powerpoint/2010/main" xmlns:p15="http://schemas.microsoft.com/office/powerpoint/2012/main" xmlns:mc="http://schemas.openxmlformats.org/markup-compatibility/2006" type="twoObj" preserve="1">
+<p:sldLayout xmlns:a="http://schemas.openxmlformats.org/drawingml/2006/main" xmlns:r="http://schemas.openxmlformats.org/officeDocument/2006/relationships" xmlns:p="http://schemas.openxmlformats.org/presentationml/2006/main" type="twoObj" preserve="1">
   <p:cSld name="Title, 2 Content">
     <p:spTree>
       <p:nvGrpSpPr>
@@ -1372,11 +1511,12 @@
           </a:ln>
         </p:spPr>
         <p:txBody>
-          <a:bodyPr lIns="0" rIns="0" tIns="0" bIns="0" anchor="ctr">
+          <a:bodyPr lIns="0" tIns="0" rIns="0" bIns="0" anchor="ctr">
             <a:noAutofit/>
           </a:bodyPr>
-          <a:p>
-            <a:endParaRPr b="0" lang="en-US" sz="1800" spc="-1" strike="noStrike">
+          <a:lstStyle/>
+          <a:p>
+            <a:endParaRPr lang="en-US" sz="1800" b="0" strike="noStrike" spc="-1">
               <a:solidFill>
                 <a:srgbClr val="000000"/>
               </a:solidFill>
@@ -1409,9 +1549,10 @@
           </a:ln>
         </p:spPr>
         <p:txBody>
-          <a:bodyPr lIns="0" rIns="0" tIns="0" bIns="0" anchor="t">
+          <a:bodyPr lIns="0" tIns="0" rIns="0" bIns="0" anchor="t">
             <a:normAutofit/>
           </a:bodyPr>
+          <a:lstStyle/>
           <a:p>
             <a:pPr>
               <a:lnSpc>
@@ -1422,7 +1563,7 @@
               </a:spcBef>
               <a:buNone/>
             </a:pPr>
-            <a:endParaRPr b="0" lang="en-US" sz="820" spc="-1" strike="noStrike">
+            <a:endParaRPr lang="en-US" sz="820" b="0" strike="noStrike" spc="-1">
               <a:solidFill>
                 <a:srgbClr val="000000"/>
               </a:solidFill>
@@ -1455,9 +1596,10 @@
           </a:ln>
         </p:spPr>
         <p:txBody>
-          <a:bodyPr lIns="0" rIns="0" tIns="0" bIns="0" anchor="t">
+          <a:bodyPr lIns="0" tIns="0" rIns="0" bIns="0" anchor="t">
             <a:normAutofit/>
           </a:bodyPr>
+          <a:lstStyle/>
           <a:p>
             <a:pPr>
               <a:lnSpc>
@@ -1468,7 +1610,7 @@
               </a:spcBef>
               <a:buNone/>
             </a:pPr>
-            <a:endParaRPr b="0" lang="en-US" sz="820" spc="-1" strike="noStrike">
+            <a:endParaRPr lang="en-US" sz="820" b="0" strike="noStrike" spc="-1">
               <a:solidFill>
                 <a:srgbClr val="000000"/>
               </a:solidFill>
@@ -1490,6 +1632,7 @@
         <p:spPr/>
         <p:txBody>
           <a:bodyPr/>
+          <a:lstStyle/>
           <a:p>
             <a:r>
               <a:t>Footer</a:t>
@@ -1510,10 +1653,12 @@
         <p:spPr/>
         <p:txBody>
           <a:bodyPr/>
+          <a:lstStyle/>
           <a:p>
             <a:fld id="{4B03D904-A590-48C3-BE02-1A3FDD67A885}" type="slidenum">
-              <a:t>&lt;#&gt;</a:t>
+              <a:t>‹#›</a:t>
             </a:fld>
+            <a:endParaRPr/>
           </a:p>
         </p:txBody>
       </p:sp>
@@ -1530,21 +1675,22 @@
         <p:spPr/>
         <p:txBody>
           <a:bodyPr/>
-          <a:p>
-            <a:r>
-              <a:rPr lang="en-US"/>
-              <a:t/>
-            </a:r>
+          <a:lstStyle/>
+          <a:p>
+            <a:endParaRPr/>
           </a:p>
         </p:txBody>
       </p:sp>
     </p:spTree>
   </p:cSld>
+  <p:clrMapOvr>
+    <a:masterClrMapping/>
+  </p:clrMapOvr>
 </p:sldLayout>
 </file>
 
 <file path=ppt/slideLayouts/slideLayout5.xml><?xml version="1.0" encoding="utf-8"?>
-<p:sldLayout xmlns:a="http://schemas.openxmlformats.org/drawingml/2006/main" xmlns:p="http://schemas.openxmlformats.org/presentationml/2006/main" xmlns:r="http://schemas.openxmlformats.org/officeDocument/2006/relationships" xmlns:p14="http://schemas.microsoft.com/office/powerpoint/2010/main" xmlns:p15="http://schemas.microsoft.com/office/powerpoint/2012/main" xmlns:mc="http://schemas.openxmlformats.org/markup-compatibility/2006" type="titleOnly" preserve="1">
+<p:sldLayout xmlns:a="http://schemas.openxmlformats.org/drawingml/2006/main" xmlns:r="http://schemas.openxmlformats.org/officeDocument/2006/relationships" xmlns:p="http://schemas.openxmlformats.org/presentationml/2006/main" type="titleOnly" preserve="1">
   <p:cSld name="Title Only">
     <p:spTree>
       <p:nvGrpSpPr>
@@ -1584,11 +1730,12 @@
           </a:ln>
         </p:spPr>
         <p:txBody>
-          <a:bodyPr lIns="0" rIns="0" tIns="0" bIns="0" anchor="ctr">
+          <a:bodyPr lIns="0" tIns="0" rIns="0" bIns="0" anchor="ctr">
             <a:noAutofit/>
           </a:bodyPr>
-          <a:p>
-            <a:endParaRPr b="0" lang="en-US" sz="1800" spc="-1" strike="noStrike">
+          <a:lstStyle/>
+          <a:p>
+            <a:endParaRPr lang="en-US" sz="1800" b="0" strike="noStrike" spc="-1">
               <a:solidFill>
                 <a:srgbClr val="000000"/>
               </a:solidFill>
@@ -1610,6 +1757,7 @@
         <p:spPr/>
         <p:txBody>
           <a:bodyPr/>
+          <a:lstStyle/>
           <a:p>
             <a:r>
               <a:t>Footer</a:t>
@@ -1630,10 +1778,12 @@
         <p:spPr/>
         <p:txBody>
           <a:bodyPr/>
+          <a:lstStyle/>
           <a:p>
             <a:fld id="{0D41B6F6-62B8-4A03-921A-1649BA4FF7E6}" type="slidenum">
-              <a:t>&lt;#&gt;</a:t>
+              <a:t>‹#›</a:t>
             </a:fld>
+            <a:endParaRPr/>
           </a:p>
         </p:txBody>
       </p:sp>
@@ -1650,21 +1800,22 @@
         <p:spPr/>
         <p:txBody>
           <a:bodyPr/>
-          <a:p>
-            <a:r>
-              <a:rPr lang="en-US"/>
-              <a:t/>
-            </a:r>
+          <a:lstStyle/>
+          <a:p>
+            <a:endParaRPr/>
           </a:p>
         </p:txBody>
       </p:sp>
     </p:spTree>
   </p:cSld>
+  <p:clrMapOvr>
+    <a:masterClrMapping/>
+  </p:clrMapOvr>
 </p:sldLayout>
 </file>
 
 <file path=ppt/slideLayouts/slideLayout6.xml><?xml version="1.0" encoding="utf-8"?>
-<p:sldLayout xmlns:a="http://schemas.openxmlformats.org/drawingml/2006/main" xmlns:p="http://schemas.openxmlformats.org/presentationml/2006/main" xmlns:r="http://schemas.openxmlformats.org/officeDocument/2006/relationships" xmlns:p14="http://schemas.microsoft.com/office/powerpoint/2010/main" xmlns:p15="http://schemas.microsoft.com/office/powerpoint/2012/main" xmlns:mc="http://schemas.openxmlformats.org/markup-compatibility/2006" type="objOnly" preserve="1">
+<p:sldLayout xmlns:a="http://schemas.openxmlformats.org/drawingml/2006/main" xmlns:r="http://schemas.openxmlformats.org/officeDocument/2006/relationships" xmlns:p="http://schemas.openxmlformats.org/presentationml/2006/main" type="objOnly" preserve="1">
   <p:cSld name="Centered Text">
     <p:spTree>
       <p:nvGrpSpPr>
@@ -1704,14 +1855,15 @@
           </a:ln>
         </p:spPr>
         <p:txBody>
-          <a:bodyPr lIns="0" rIns="0" tIns="0" bIns="0" anchor="ctr">
+          <a:bodyPr lIns="0" tIns="0" rIns="0" bIns="0" anchor="ctr">
             <a:noAutofit/>
           </a:bodyPr>
+          <a:lstStyle/>
           <a:p>
             <a:pPr algn="ctr">
               <a:buNone/>
             </a:pPr>
-            <a:endParaRPr b="0" lang="en-US" sz="3200" spc="-1" strike="noStrike">
+            <a:endParaRPr lang="en-US" sz="3200" b="0" strike="noStrike" spc="-1">
               <a:latin typeface="Arial"/>
             </a:endParaRPr>
           </a:p>
@@ -1730,6 +1882,7 @@
         <p:spPr/>
         <p:txBody>
           <a:bodyPr/>
+          <a:lstStyle/>
           <a:p>
             <a:r>
               <a:t>Footer</a:t>
@@ -1750,10 +1903,12 @@
         <p:spPr/>
         <p:txBody>
           <a:bodyPr/>
+          <a:lstStyle/>
           <a:p>
             <a:fld id="{CC83F455-FAC6-4DC1-B572-8620660EB9D9}" type="slidenum">
-              <a:t>&lt;#&gt;</a:t>
+              <a:t>‹#›</a:t>
             </a:fld>
+            <a:endParaRPr/>
           </a:p>
         </p:txBody>
       </p:sp>
@@ -1770,21 +1925,22 @@
         <p:spPr/>
         <p:txBody>
           <a:bodyPr/>
-          <a:p>
-            <a:r>
-              <a:rPr lang="en-US"/>
-              <a:t/>
-            </a:r>
+          <a:lstStyle/>
+          <a:p>
+            <a:endParaRPr/>
           </a:p>
         </p:txBody>
       </p:sp>
     </p:spTree>
   </p:cSld>
+  <p:clrMapOvr>
+    <a:masterClrMapping/>
+  </p:clrMapOvr>
 </p:sldLayout>
 </file>
 
 <file path=ppt/slideLayouts/slideLayout7.xml><?xml version="1.0" encoding="utf-8"?>
-<p:sldLayout xmlns:a="http://schemas.openxmlformats.org/drawingml/2006/main" xmlns:p="http://schemas.openxmlformats.org/presentationml/2006/main" xmlns:r="http://schemas.openxmlformats.org/officeDocument/2006/relationships" xmlns:p14="http://schemas.microsoft.com/office/powerpoint/2010/main" xmlns:p15="http://schemas.microsoft.com/office/powerpoint/2012/main" xmlns:mc="http://schemas.openxmlformats.org/markup-compatibility/2006" type="twoObjAndObj" preserve="1">
+<p:sldLayout xmlns:a="http://schemas.openxmlformats.org/drawingml/2006/main" xmlns:r="http://schemas.openxmlformats.org/officeDocument/2006/relationships" xmlns:p="http://schemas.openxmlformats.org/presentationml/2006/main" type="twoObjAndObj" preserve="1">
   <p:cSld name="Title, 2 Content and Content">
     <p:spTree>
       <p:nvGrpSpPr>
@@ -1824,11 +1980,12 @@
           </a:ln>
         </p:spPr>
         <p:txBody>
-          <a:bodyPr lIns="0" rIns="0" tIns="0" bIns="0" anchor="ctr">
+          <a:bodyPr lIns="0" tIns="0" rIns="0" bIns="0" anchor="ctr">
             <a:noAutofit/>
           </a:bodyPr>
-          <a:p>
-            <a:endParaRPr b="0" lang="en-US" sz="1800" spc="-1" strike="noStrike">
+          <a:lstStyle/>
+          <a:p>
+            <a:endParaRPr lang="en-US" sz="1800" b="0" strike="noStrike" spc="-1">
               <a:solidFill>
                 <a:srgbClr val="000000"/>
               </a:solidFill>
@@ -1861,9 +2018,10 @@
           </a:ln>
         </p:spPr>
         <p:txBody>
-          <a:bodyPr lIns="0" rIns="0" tIns="0" bIns="0" anchor="t">
+          <a:bodyPr lIns="0" tIns="0" rIns="0" bIns="0" anchor="t">
             <a:normAutofit/>
           </a:bodyPr>
+          <a:lstStyle/>
           <a:p>
             <a:pPr>
               <a:lnSpc>
@@ -1874,7 +2032,7 @@
               </a:spcBef>
               <a:buNone/>
             </a:pPr>
-            <a:endParaRPr b="0" lang="en-US" sz="820" spc="-1" strike="noStrike">
+            <a:endParaRPr lang="en-US" sz="820" b="0" strike="noStrike" spc="-1">
               <a:solidFill>
                 <a:srgbClr val="000000"/>
               </a:solidFill>
@@ -1907,9 +2065,10 @@
           </a:ln>
         </p:spPr>
         <p:txBody>
-          <a:bodyPr lIns="0" rIns="0" tIns="0" bIns="0" anchor="t">
+          <a:bodyPr lIns="0" tIns="0" rIns="0" bIns="0" anchor="t">
             <a:normAutofit/>
           </a:bodyPr>
+          <a:lstStyle/>
           <a:p>
             <a:pPr>
               <a:lnSpc>
@@ -1920,7 +2079,7 @@
               </a:spcBef>
               <a:buNone/>
             </a:pPr>
-            <a:endParaRPr b="0" lang="en-US" sz="820" spc="-1" strike="noStrike">
+            <a:endParaRPr lang="en-US" sz="820" b="0" strike="noStrike" spc="-1">
               <a:solidFill>
                 <a:srgbClr val="000000"/>
               </a:solidFill>
@@ -1953,9 +2112,10 @@
           </a:ln>
         </p:spPr>
         <p:txBody>
-          <a:bodyPr lIns="0" rIns="0" tIns="0" bIns="0" anchor="t">
+          <a:bodyPr lIns="0" tIns="0" rIns="0" bIns="0" anchor="t">
             <a:normAutofit/>
           </a:bodyPr>
+          <a:lstStyle/>
           <a:p>
             <a:pPr>
               <a:lnSpc>
@@ -1966,7 +2126,7 @@
               </a:spcBef>
               <a:buNone/>
             </a:pPr>
-            <a:endParaRPr b="0" lang="en-US" sz="820" spc="-1" strike="noStrike">
+            <a:endParaRPr lang="en-US" sz="820" b="0" strike="noStrike" spc="-1">
               <a:solidFill>
                 <a:srgbClr val="000000"/>
               </a:solidFill>
@@ -1988,6 +2148,7 @@
         <p:spPr/>
         <p:txBody>
           <a:bodyPr/>
+          <a:lstStyle/>
           <a:p>
             <a:r>
               <a:t>Footer</a:t>
@@ -2008,10 +2169,12 @@
         <p:spPr/>
         <p:txBody>
           <a:bodyPr/>
+          <a:lstStyle/>
           <a:p>
             <a:fld id="{606B282F-0D75-4396-BB4B-2A319E8D17B4}" type="slidenum">
-              <a:t>&lt;#&gt;</a:t>
+              <a:t>‹#›</a:t>
             </a:fld>
+            <a:endParaRPr/>
           </a:p>
         </p:txBody>
       </p:sp>
@@ -2028,21 +2191,22 @@
         <p:spPr/>
         <p:txBody>
           <a:bodyPr/>
-          <a:p>
-            <a:r>
-              <a:rPr lang="en-US"/>
-              <a:t/>
-            </a:r>
+          <a:lstStyle/>
+          <a:p>
+            <a:endParaRPr/>
           </a:p>
         </p:txBody>
       </p:sp>
     </p:spTree>
   </p:cSld>
+  <p:clrMapOvr>
+    <a:masterClrMapping/>
+  </p:clrMapOvr>
 </p:sldLayout>
 </file>
 
 <file path=ppt/slideLayouts/slideLayout8.xml><?xml version="1.0" encoding="utf-8"?>
-<p:sldLayout xmlns:a="http://schemas.openxmlformats.org/drawingml/2006/main" xmlns:p="http://schemas.openxmlformats.org/presentationml/2006/main" xmlns:r="http://schemas.openxmlformats.org/officeDocument/2006/relationships" xmlns:p14="http://schemas.microsoft.com/office/powerpoint/2010/main" xmlns:p15="http://schemas.microsoft.com/office/powerpoint/2012/main" xmlns:mc="http://schemas.openxmlformats.org/markup-compatibility/2006" type="objAndTwoObj" preserve="1">
+<p:sldLayout xmlns:a="http://schemas.openxmlformats.org/drawingml/2006/main" xmlns:r="http://schemas.openxmlformats.org/officeDocument/2006/relationships" xmlns:p="http://schemas.openxmlformats.org/presentationml/2006/main" type="objAndTwoObj" preserve="1">
   <p:cSld name="Title Content and 2 Content">
     <p:spTree>
       <p:nvGrpSpPr>
@@ -2082,11 +2246,12 @@
           </a:ln>
         </p:spPr>
         <p:txBody>
-          <a:bodyPr lIns="0" rIns="0" tIns="0" bIns="0" anchor="ctr">
+          <a:bodyPr lIns="0" tIns="0" rIns="0" bIns="0" anchor="ctr">
             <a:noAutofit/>
           </a:bodyPr>
-          <a:p>
-            <a:endParaRPr b="0" lang="en-US" sz="1800" spc="-1" strike="noStrike">
+          <a:lstStyle/>
+          <a:p>
+            <a:endParaRPr lang="en-US" sz="1800" b="0" strike="noStrike" spc="-1">
               <a:solidFill>
                 <a:srgbClr val="000000"/>
               </a:solidFill>
@@ -2119,9 +2284,10 @@
           </a:ln>
         </p:spPr>
         <p:txBody>
-          <a:bodyPr lIns="0" rIns="0" tIns="0" bIns="0" anchor="t">
+          <a:bodyPr lIns="0" tIns="0" rIns="0" bIns="0" anchor="t">
             <a:normAutofit/>
           </a:bodyPr>
+          <a:lstStyle/>
           <a:p>
             <a:pPr>
               <a:lnSpc>
@@ -2132,7 +2298,7 @@
               </a:spcBef>
               <a:buNone/>
             </a:pPr>
-            <a:endParaRPr b="0" lang="en-US" sz="820" spc="-1" strike="noStrike">
+            <a:endParaRPr lang="en-US" sz="820" b="0" strike="noStrike" spc="-1">
               <a:solidFill>
                 <a:srgbClr val="000000"/>
               </a:solidFill>
@@ -2165,9 +2331,10 @@
           </a:ln>
         </p:spPr>
         <p:txBody>
-          <a:bodyPr lIns="0" rIns="0" tIns="0" bIns="0" anchor="t">
+          <a:bodyPr lIns="0" tIns="0" rIns="0" bIns="0" anchor="t">
             <a:normAutofit/>
           </a:bodyPr>
+          <a:lstStyle/>
           <a:p>
             <a:pPr>
               <a:lnSpc>
@@ -2178,7 +2345,7 @@
               </a:spcBef>
               <a:buNone/>
             </a:pPr>
-            <a:endParaRPr b="0" lang="en-US" sz="820" spc="-1" strike="noStrike">
+            <a:endParaRPr lang="en-US" sz="820" b="0" strike="noStrike" spc="-1">
               <a:solidFill>
                 <a:srgbClr val="000000"/>
               </a:solidFill>
@@ -2211,9 +2378,10 @@
           </a:ln>
         </p:spPr>
         <p:txBody>
-          <a:bodyPr lIns="0" rIns="0" tIns="0" bIns="0" anchor="t">
+          <a:bodyPr lIns="0" tIns="0" rIns="0" bIns="0" anchor="t">
             <a:normAutofit/>
           </a:bodyPr>
+          <a:lstStyle/>
           <a:p>
             <a:pPr>
               <a:lnSpc>
@@ -2224,7 +2392,7 @@
               </a:spcBef>
               <a:buNone/>
             </a:pPr>
-            <a:endParaRPr b="0" lang="en-US" sz="820" spc="-1" strike="noStrike">
+            <a:endParaRPr lang="en-US" sz="820" b="0" strike="noStrike" spc="-1">
               <a:solidFill>
                 <a:srgbClr val="000000"/>
               </a:solidFill>
@@ -2246,6 +2414,7 @@
         <p:spPr/>
         <p:txBody>
           <a:bodyPr/>
+          <a:lstStyle/>
           <a:p>
             <a:r>
               <a:t>Footer</a:t>
@@ -2266,10 +2435,12 @@
         <p:spPr/>
         <p:txBody>
           <a:bodyPr/>
+          <a:lstStyle/>
           <a:p>
             <a:fld id="{855AC26C-DAD5-4AF8-AEF9-D348508C8BF4}" type="slidenum">
-              <a:t>&lt;#&gt;</a:t>
+              <a:t>‹#›</a:t>
             </a:fld>
+            <a:endParaRPr/>
           </a:p>
         </p:txBody>
       </p:sp>
@@ -2286,21 +2457,22 @@
         <p:spPr/>
         <p:txBody>
           <a:bodyPr/>
-          <a:p>
-            <a:r>
-              <a:rPr lang="en-US"/>
-              <a:t/>
-            </a:r>
+          <a:lstStyle/>
+          <a:p>
+            <a:endParaRPr/>
           </a:p>
         </p:txBody>
       </p:sp>
     </p:spTree>
   </p:cSld>
+  <p:clrMapOvr>
+    <a:masterClrMapping/>
+  </p:clrMapOvr>
 </p:sldLayout>
 </file>
 
 <file path=ppt/slideLayouts/slideLayout9.xml><?xml version="1.0" encoding="utf-8"?>
-<p:sldLayout xmlns:a="http://schemas.openxmlformats.org/drawingml/2006/main" xmlns:p="http://schemas.openxmlformats.org/presentationml/2006/main" xmlns:r="http://schemas.openxmlformats.org/officeDocument/2006/relationships" xmlns:p14="http://schemas.microsoft.com/office/powerpoint/2010/main" xmlns:p15="http://schemas.microsoft.com/office/powerpoint/2012/main" xmlns:mc="http://schemas.openxmlformats.org/markup-compatibility/2006" type="twoObjOverTx" preserve="1">
+<p:sldLayout xmlns:a="http://schemas.openxmlformats.org/drawingml/2006/main" xmlns:r="http://schemas.openxmlformats.org/officeDocument/2006/relationships" xmlns:p="http://schemas.openxmlformats.org/presentationml/2006/main" type="twoObjOverTx" preserve="1">
   <p:cSld name="Title, 2 Content over Content">
     <p:spTree>
       <p:nvGrpSpPr>
@@ -2340,11 +2512,12 @@
           </a:ln>
         </p:spPr>
         <p:txBody>
-          <a:bodyPr lIns="0" rIns="0" tIns="0" bIns="0" anchor="ctr">
+          <a:bodyPr lIns="0" tIns="0" rIns="0" bIns="0" anchor="ctr">
             <a:noAutofit/>
           </a:bodyPr>
-          <a:p>
-            <a:endParaRPr b="0" lang="en-US" sz="1800" spc="-1" strike="noStrike">
+          <a:lstStyle/>
+          <a:p>
+            <a:endParaRPr lang="en-US" sz="1800" b="0" strike="noStrike" spc="-1">
               <a:solidFill>
                 <a:srgbClr val="000000"/>
               </a:solidFill>
@@ -2377,9 +2550,10 @@
           </a:ln>
         </p:spPr>
         <p:txBody>
-          <a:bodyPr lIns="0" rIns="0" tIns="0" bIns="0" anchor="t">
+          <a:bodyPr lIns="0" tIns="0" rIns="0" bIns="0" anchor="t">
             <a:normAutofit/>
           </a:bodyPr>
+          <a:lstStyle/>
           <a:p>
             <a:pPr>
               <a:lnSpc>
@@ -2390,7 +2564,7 @@
               </a:spcBef>
               <a:buNone/>
             </a:pPr>
-            <a:endParaRPr b="0" lang="en-US" sz="820" spc="-1" strike="noStrike">
+            <a:endParaRPr lang="en-US" sz="820" b="0" strike="noStrike" spc="-1">
               <a:solidFill>
                 <a:srgbClr val="000000"/>
               </a:solidFill>
@@ -2423,9 +2597,10 @@
           </a:ln>
         </p:spPr>
         <p:txBody>
-          <a:bodyPr lIns="0" rIns="0" tIns="0" bIns="0" anchor="t">
+          <a:bodyPr lIns="0" tIns="0" rIns="0" bIns="0" anchor="t">
             <a:normAutofit/>
           </a:bodyPr>
+          <a:lstStyle/>
           <a:p>
             <a:pPr>
               <a:lnSpc>
@@ -2436,7 +2611,7 @@
               </a:spcBef>
               <a:buNone/>
             </a:pPr>
-            <a:endParaRPr b="0" lang="en-US" sz="820" spc="-1" strike="noStrike">
+            <a:endParaRPr lang="en-US" sz="820" b="0" strike="noStrike" spc="-1">
               <a:solidFill>
                 <a:srgbClr val="000000"/>
               </a:solidFill>
@@ -2469,9 +2644,10 @@
           </a:ln>
         </p:spPr>
         <p:txBody>
-          <a:bodyPr lIns="0" rIns="0" tIns="0" bIns="0" anchor="t">
+          <a:bodyPr lIns="0" tIns="0" rIns="0" bIns="0" anchor="t">
             <a:normAutofit/>
           </a:bodyPr>
+          <a:lstStyle/>
           <a:p>
             <a:pPr>
               <a:lnSpc>
@@ -2482,7 +2658,7 @@
               </a:spcBef>
               <a:buNone/>
             </a:pPr>
-            <a:endParaRPr b="0" lang="en-US" sz="820" spc="-1" strike="noStrike">
+            <a:endParaRPr lang="en-US" sz="820" b="0" strike="noStrike" spc="-1">
               <a:solidFill>
                 <a:srgbClr val="000000"/>
               </a:solidFill>
@@ -2504,6 +2680,7 @@
         <p:spPr/>
         <p:txBody>
           <a:bodyPr/>
+          <a:lstStyle/>
           <a:p>
             <a:r>
               <a:t>Footer</a:t>
@@ -2524,10 +2701,12 @@
         <p:spPr/>
         <p:txBody>
           <a:bodyPr/>
+          <a:lstStyle/>
           <a:p>
             <a:fld id="{E7471158-D25B-4F46-8770-D1F73CDA05FC}" type="slidenum">
-              <a:t>&lt;#&gt;</a:t>
+              <a:t>‹#›</a:t>
             </a:fld>
+            <a:endParaRPr/>
           </a:p>
         </p:txBody>
       </p:sp>
@@ -2544,27 +2723,29 @@
         <p:spPr/>
         <p:txBody>
           <a:bodyPr/>
-          <a:p>
-            <a:r>
-              <a:rPr lang="en-US"/>
-              <a:t/>
-            </a:r>
+          <a:lstStyle/>
+          <a:p>
+            <a:endParaRPr/>
           </a:p>
         </p:txBody>
       </p:sp>
     </p:spTree>
   </p:cSld>
+  <p:clrMapOvr>
+    <a:masterClrMapping/>
+  </p:clrMapOvr>
 </p:sldLayout>
 </file>
 
 <file path=ppt/slideMasters/slideMaster1.xml><?xml version="1.0" encoding="utf-8"?>
-<p:sldMaster xmlns:a="http://schemas.openxmlformats.org/drawingml/2006/main" xmlns:p="http://schemas.openxmlformats.org/presentationml/2006/main" xmlns:r="http://schemas.openxmlformats.org/officeDocument/2006/relationships" xmlns:p14="http://schemas.microsoft.com/office/powerpoint/2010/main" xmlns:p15="http://schemas.microsoft.com/office/powerpoint/2012/main" xmlns:mc="http://schemas.openxmlformats.org/markup-compatibility/2006">
+<p:sldMaster xmlns:a="http://schemas.openxmlformats.org/drawingml/2006/main" xmlns:r="http://schemas.openxmlformats.org/officeDocument/2006/relationships" xmlns:p="http://schemas.openxmlformats.org/presentationml/2006/main">
   <p:cSld>
     <p:bg>
       <p:bgPr>
         <a:solidFill>
-          <a:srgbClr val="ffffff"/>
+          <a:srgbClr val="FFFFFF"/>
         </a:solidFill>
+        <a:effectLst/>
       </p:bgPr>
     </p:bg>
     <p:spTree>
@@ -2583,7 +2764,7 @@
       </p:grpSpPr>
       <p:sp>
         <p:nvSpPr>
-          <p:cNvPr id="0" name="PlaceHolder 1"/>
+          <p:cNvPr id="5" name="PlaceHolder 1"/>
           <p:cNvSpPr>
             <a:spLocks noGrp="1"/>
           </p:cNvSpPr>
@@ -2614,9 +2795,9 @@
                 <a:spcPct val="100000"/>
               </a:lnSpc>
               <a:buNone/>
-              <a:defRPr b="0" lang="en-US" sz="350" spc="-1" strike="noStrike">
+              <a:defRPr lang="en-US" sz="350" b="0" strike="noStrike" spc="-1">
                 <a:solidFill>
-                  <a:srgbClr val="8b8b8b"/>
+                  <a:srgbClr val="8B8B8B"/>
                 </a:solidFill>
                 <a:latin typeface="Calibri"/>
               </a:defRPr>
@@ -2630,15 +2811,15 @@
               <a:buNone/>
             </a:pPr>
             <a:r>
-              <a:rPr b="0" lang="en-US" sz="350" spc="-1" strike="noStrike">
+              <a:rPr lang="en-US" sz="350" b="0" strike="noStrike" spc="-1">
                 <a:solidFill>
-                  <a:srgbClr val="8b8b8b"/>
+                  <a:srgbClr val="8B8B8B"/>
                 </a:solidFill>
                 <a:latin typeface="Calibri"/>
               </a:rPr>
               <a:t>&lt;date/time&gt;</a:t>
             </a:r>
-            <a:endParaRPr b="0" lang="en-US" sz="350" spc="-1" strike="noStrike">
+            <a:endParaRPr lang="en-US" sz="350" b="0" strike="noStrike" spc="-1">
               <a:latin typeface="Times New Roman"/>
             </a:endParaRPr>
           </a:p>
@@ -2646,7 +2827,7 @@
       </p:sp>
       <p:sp>
         <p:nvSpPr>
-          <p:cNvPr id="1" name="PlaceHolder 2"/>
+          <p:cNvPr id="6" name="PlaceHolder 2"/>
           <p:cNvSpPr>
             <a:spLocks noGrp="1"/>
           </p:cNvSpPr>
@@ -2674,7 +2855,7 @@
           <a:lstStyle>
             <a:lvl1pPr algn="ctr">
               <a:buNone/>
-              <a:defRPr b="0" lang="en-US" sz="1400" spc="-1" strike="noStrike">
+              <a:defRPr lang="en-US" sz="1400" b="0" strike="noStrike" spc="-1">
                 <a:latin typeface="Times New Roman"/>
               </a:defRPr>
             </a:lvl1pPr>
@@ -2684,14 +2865,11 @@
               <a:buNone/>
             </a:pPr>
             <a:r>
-              <a:rPr b="0" lang="en-US" sz="1400" spc="-1" strike="noStrike">
+              <a:rPr lang="en-US" sz="1400" b="0" strike="noStrike" spc="-1">
                 <a:latin typeface="Times New Roman"/>
               </a:rPr>
               <a:t>&lt;footer&gt;</a:t>
             </a:r>
-            <a:endParaRPr b="0" lang="en-US" sz="1400" spc="-1" strike="noStrike">
-              <a:latin typeface="Times New Roman"/>
-            </a:endParaRPr>
           </a:p>
         </p:txBody>
       </p:sp>
@@ -2728,9 +2906,9 @@
                 <a:spcPct val="100000"/>
               </a:lnSpc>
               <a:buNone/>
-              <a:defRPr b="0" lang="en-US" sz="350" spc="-1" strike="noStrike">
+              <a:defRPr lang="en-US" sz="350" b="0" strike="noStrike" spc="-1">
                 <a:solidFill>
-                  <a:srgbClr val="8b8b8b"/>
+                  <a:srgbClr val="8B8B8B"/>
                 </a:solidFill>
                 <a:latin typeface="Calibri"/>
               </a:defRPr>
@@ -2744,15 +2922,15 @@
               <a:buNone/>
             </a:pPr>
             <a:fld id="{F42DB70C-4941-4CC0-B1E8-43292DC76BD3}" type="slidenum">
-              <a:rPr b="0" lang="en-US" sz="350" spc="-1" strike="noStrike">
+              <a:rPr lang="en-US" sz="350" b="0" strike="noStrike" spc="-1">
                 <a:solidFill>
-                  <a:srgbClr val="8b8b8b"/>
+                  <a:srgbClr val="8B8B8B"/>
                 </a:solidFill>
                 <a:latin typeface="Calibri"/>
               </a:rPr>
-              <a:t>&lt;number&gt;</a:t>
+              <a:t>‹#›</a:t>
             </a:fld>
-            <a:endParaRPr b="0" lang="en-US" sz="350" spc="-1" strike="noStrike">
+            <a:endParaRPr lang="en-US" sz="350" b="0" strike="noStrike" spc="-1">
               <a:latin typeface="Times New Roman"/>
             </a:endParaRPr>
           </a:p>
@@ -2782,12 +2960,13 @@
           </a:ln>
         </p:spPr>
         <p:txBody>
-          <a:bodyPr lIns="0" rIns="0" tIns="0" bIns="0" anchor="ctr">
+          <a:bodyPr lIns="0" tIns="0" rIns="0" bIns="0" anchor="ctr">
             <a:noAutofit/>
           </a:bodyPr>
+          <a:lstStyle/>
           <a:p>
             <a:r>
-              <a:rPr b="0" lang="en-US" sz="1800" spc="-1" strike="noStrike">
+              <a:rPr lang="en-US" sz="1800" b="0" strike="noStrike" spc="-1">
                 <a:solidFill>
                   <a:srgbClr val="000000"/>
                 </a:solidFill>
@@ -2795,12 +2974,6 @@
               </a:rPr>
               <a:t>Click to edit the title text format</a:t>
             </a:r>
-            <a:endParaRPr b="0" lang="en-US" sz="1800" spc="-1" strike="noStrike">
-              <a:solidFill>
-                <a:srgbClr val="000000"/>
-              </a:solidFill>
-              <a:latin typeface="Calibri"/>
-            </a:endParaRPr>
           </a:p>
         </p:txBody>
       </p:sp>
@@ -2828,9 +3001,10 @@
           </a:ln>
         </p:spPr>
         <p:txBody>
-          <a:bodyPr lIns="0" rIns="0" tIns="0" bIns="0" anchor="t">
+          <a:bodyPr lIns="0" tIns="0" rIns="0" bIns="0" anchor="t">
             <a:normAutofit fontScale="70000"/>
           </a:bodyPr>
+          <a:lstStyle/>
           <a:p>
             <a:pPr marL="432000" indent="-324000">
               <a:lnSpc>
@@ -2847,7 +3021,7 @@
               <a:buChar char=""/>
             </a:pPr>
             <a:r>
-              <a:rPr b="0" lang="en-US" sz="820" spc="-1" strike="noStrike">
+              <a:rPr lang="en-US" sz="820" b="0" strike="noStrike" spc="-1">
                 <a:solidFill>
                   <a:srgbClr val="000000"/>
                 </a:solidFill>
@@ -2855,15 +3029,9 @@
               </a:rPr>
               <a:t>Click to edit the outline text format</a:t>
             </a:r>
-            <a:endParaRPr b="0" lang="en-US" sz="820" spc="-1" strike="noStrike">
-              <a:solidFill>
-                <a:srgbClr val="000000"/>
-              </a:solidFill>
-              <a:latin typeface="Calibri"/>
-            </a:endParaRPr>
-          </a:p>
-          <a:p>
-            <a:pPr lvl="1" marL="864000" indent="-324000">
+          </a:p>
+          <a:p>
+            <a:pPr marL="864000" lvl="1" indent="-324000">
               <a:lnSpc>
                 <a:spcPct val="90000"/>
               </a:lnSpc>
@@ -2878,7 +3046,7 @@
               <a:buChar char=""/>
             </a:pPr>
             <a:r>
-              <a:rPr b="0" lang="en-US" sz="580" spc="-1" strike="noStrike">
+              <a:rPr lang="en-US" sz="580" b="0" strike="noStrike" spc="-1">
                 <a:solidFill>
                   <a:srgbClr val="000000"/>
                 </a:solidFill>
@@ -2886,15 +3054,9 @@
               </a:rPr>
               <a:t>Second Outline Level</a:t>
             </a:r>
-            <a:endParaRPr b="0" lang="en-US" sz="580" spc="-1" strike="noStrike">
-              <a:solidFill>
-                <a:srgbClr val="000000"/>
-              </a:solidFill>
-              <a:latin typeface="Calibri"/>
-            </a:endParaRPr>
-          </a:p>
-          <a:p>
-            <a:pPr lvl="2" marL="1296000" indent="-288000">
+          </a:p>
+          <a:p>
+            <a:pPr marL="1296000" lvl="2" indent="-288000">
               <a:lnSpc>
                 <a:spcPct val="90000"/>
               </a:lnSpc>
@@ -2909,7 +3071,7 @@
               <a:buChar char=""/>
             </a:pPr>
             <a:r>
-              <a:rPr b="0" lang="en-US" sz="520" spc="-1" strike="noStrike">
+              <a:rPr lang="en-US" sz="520" b="0" strike="noStrike" spc="-1">
                 <a:solidFill>
                   <a:srgbClr val="000000"/>
                 </a:solidFill>
@@ -2917,15 +3079,9 @@
               </a:rPr>
               <a:t>Third Outline Level</a:t>
             </a:r>
-            <a:endParaRPr b="0" lang="en-US" sz="520" spc="-1" strike="noStrike">
-              <a:solidFill>
-                <a:srgbClr val="000000"/>
-              </a:solidFill>
-              <a:latin typeface="Calibri"/>
-            </a:endParaRPr>
-          </a:p>
-          <a:p>
-            <a:pPr lvl="3" marL="1728000" indent="-216000">
+          </a:p>
+          <a:p>
+            <a:pPr marL="1728000" lvl="3" indent="-216000">
               <a:lnSpc>
                 <a:spcPct val="90000"/>
               </a:lnSpc>
@@ -2940,7 +3096,7 @@
               <a:buChar char=""/>
             </a:pPr>
             <a:r>
-              <a:rPr b="0" lang="en-US" sz="520" spc="-1" strike="noStrike">
+              <a:rPr lang="en-US" sz="520" b="0" strike="noStrike" spc="-1">
                 <a:solidFill>
                   <a:srgbClr val="000000"/>
                 </a:solidFill>
@@ -2948,15 +3104,9 @@
               </a:rPr>
               <a:t>Fourth Outline Level</a:t>
             </a:r>
-            <a:endParaRPr b="0" lang="en-US" sz="520" spc="-1" strike="noStrike">
-              <a:solidFill>
-                <a:srgbClr val="000000"/>
-              </a:solidFill>
-              <a:latin typeface="Calibri"/>
-            </a:endParaRPr>
-          </a:p>
-          <a:p>
-            <a:pPr lvl="4" marL="2160000" indent="-216000">
+          </a:p>
+          <a:p>
+            <a:pPr marL="2160000" lvl="4" indent="-216000">
               <a:lnSpc>
                 <a:spcPct val="90000"/>
               </a:lnSpc>
@@ -2971,7 +3121,7 @@
               <a:buChar char=""/>
             </a:pPr>
             <a:r>
-              <a:rPr b="0" lang="en-US" sz="2000" spc="-1" strike="noStrike">
+              <a:rPr lang="en-US" sz="2000" b="0" strike="noStrike" spc="-1">
                 <a:solidFill>
                   <a:srgbClr val="000000"/>
                 </a:solidFill>
@@ -2979,15 +3129,9 @@
               </a:rPr>
               <a:t>Fifth Outline Level</a:t>
             </a:r>
-            <a:endParaRPr b="0" lang="en-US" sz="2000" spc="-1" strike="noStrike">
-              <a:solidFill>
-                <a:srgbClr val="000000"/>
-              </a:solidFill>
-              <a:latin typeface="Calibri"/>
-            </a:endParaRPr>
-          </a:p>
-          <a:p>
-            <a:pPr lvl="5" marL="2592000" indent="-216000">
+          </a:p>
+          <a:p>
+            <a:pPr marL="2592000" lvl="5" indent="-216000">
               <a:lnSpc>
                 <a:spcPct val="90000"/>
               </a:lnSpc>
@@ -3002,7 +3146,7 @@
               <a:buChar char=""/>
             </a:pPr>
             <a:r>
-              <a:rPr b="0" lang="en-US" sz="2000" spc="-1" strike="noStrike">
+              <a:rPr lang="en-US" sz="2000" b="0" strike="noStrike" spc="-1">
                 <a:solidFill>
                   <a:srgbClr val="000000"/>
                 </a:solidFill>
@@ -3010,15 +3154,9 @@
               </a:rPr>
               <a:t>Sixth Outline Level</a:t>
             </a:r>
-            <a:endParaRPr b="0" lang="en-US" sz="2000" spc="-1" strike="noStrike">
-              <a:solidFill>
-                <a:srgbClr val="000000"/>
-              </a:solidFill>
-              <a:latin typeface="Calibri"/>
-            </a:endParaRPr>
-          </a:p>
-          <a:p>
-            <a:pPr lvl="6" marL="3024000" indent="-216000">
+          </a:p>
+          <a:p>
+            <a:pPr marL="3024000" lvl="6" indent="-216000">
               <a:lnSpc>
                 <a:spcPct val="90000"/>
               </a:lnSpc>
@@ -3033,7 +3171,7 @@
               <a:buChar char=""/>
             </a:pPr>
             <a:r>
-              <a:rPr b="0" lang="en-US" sz="2000" spc="-1" strike="noStrike">
+              <a:rPr lang="en-US" sz="2000" b="0" strike="noStrike" spc="-1">
                 <a:solidFill>
                   <a:srgbClr val="000000"/>
                 </a:solidFill>
@@ -3041,37 +3179,311 @@
               </a:rPr>
               <a:t>Seventh Outline Level</a:t>
             </a:r>
-            <a:endParaRPr b="0" lang="en-US" sz="2000" spc="-1" strike="noStrike">
-              <a:solidFill>
-                <a:srgbClr val="000000"/>
-              </a:solidFill>
-              <a:latin typeface="Calibri"/>
-            </a:endParaRPr>
           </a:p>
         </p:txBody>
       </p:sp>
     </p:spTree>
   </p:cSld>
-  <p:clrMap bg1="lt1" bg2="lt2" tx1="dk1" tx2="dk2" accent1="accent1" accent2="accent2" accent3="accent3" accent4="accent4" accent5="accent5" accent6="accent6" hlink="hlink" folHlink="folHlink"/>
+  <p:clrMap bg1="lt1" tx1="dk1" bg2="lt2" tx2="dk2" accent1="accent1" accent2="accent2" accent3="accent3" accent4="accent4" accent5="accent5" accent6="accent6" hlink="hlink" folHlink="folHlink"/>
   <p:sldLayoutIdLst>
-    <p:sldLayoutId id="2147483649" r:id="rId2"/>
-    <p:sldLayoutId id="2147483650" r:id="rId3"/>
-    <p:sldLayoutId id="2147483651" r:id="rId4"/>
-    <p:sldLayoutId id="2147483652" r:id="rId5"/>
-    <p:sldLayoutId id="2147483653" r:id="rId6"/>
-    <p:sldLayoutId id="2147483654" r:id="rId7"/>
-    <p:sldLayoutId id="2147483655" r:id="rId8"/>
-    <p:sldLayoutId id="2147483656" r:id="rId9"/>
-    <p:sldLayoutId id="2147483657" r:id="rId10"/>
-    <p:sldLayoutId id="2147483658" r:id="rId11"/>
-    <p:sldLayoutId id="2147483659" r:id="rId12"/>
-    <p:sldLayoutId id="2147483660" r:id="rId13"/>
+    <p:sldLayoutId id="2147483649" r:id="rId1"/>
+    <p:sldLayoutId id="2147483650" r:id="rId2"/>
+    <p:sldLayoutId id="2147483651" r:id="rId3"/>
+    <p:sldLayoutId id="2147483652" r:id="rId4"/>
+    <p:sldLayoutId id="2147483653" r:id="rId5"/>
+    <p:sldLayoutId id="2147483654" r:id="rId6"/>
+    <p:sldLayoutId id="2147483655" r:id="rId7"/>
+    <p:sldLayoutId id="2147483656" r:id="rId8"/>
+    <p:sldLayoutId id="2147483657" r:id="rId9"/>
+    <p:sldLayoutId id="2147483658" r:id="rId10"/>
+    <p:sldLayoutId id="2147483659" r:id="rId11"/>
+    <p:sldLayoutId id="2147483660" r:id="rId12"/>
   </p:sldLayoutIdLst>
+  <p:txStyles>
+    <p:titleStyle>
+      <a:lvl1pPr algn="l" defTabSz="914400" rtl="0" eaLnBrk="1" latinLnBrk="0" hangingPunct="1">
+        <a:lnSpc>
+          <a:spcPct val="90000"/>
+        </a:lnSpc>
+        <a:spcBef>
+          <a:spcPct val="0"/>
+        </a:spcBef>
+        <a:buNone/>
+        <a:defRPr sz="4400" kern="1200">
+          <a:solidFill>
+            <a:schemeClr val="tx1"/>
+          </a:solidFill>
+          <a:latin typeface="+mj-lt"/>
+          <a:ea typeface="+mj-ea"/>
+          <a:cs typeface="+mj-cs"/>
+        </a:defRPr>
+      </a:lvl1pPr>
+    </p:titleStyle>
+    <p:bodyStyle>
+      <a:lvl1pPr marL="228600" indent="-228600" algn="l" defTabSz="914400" rtl="0" eaLnBrk="1" latinLnBrk="0" hangingPunct="1">
+        <a:lnSpc>
+          <a:spcPct val="90000"/>
+        </a:lnSpc>
+        <a:spcBef>
+          <a:spcPts val="1000"/>
+        </a:spcBef>
+        <a:buFont typeface="Arial" panose="020B0604020202020204" pitchFamily="34" charset="0"/>
+        <a:buChar char="•"/>
+        <a:defRPr sz="2800" kern="1200">
+          <a:solidFill>
+            <a:schemeClr val="tx1"/>
+          </a:solidFill>
+          <a:latin typeface="+mn-lt"/>
+          <a:ea typeface="+mn-ea"/>
+          <a:cs typeface="+mn-cs"/>
+        </a:defRPr>
+      </a:lvl1pPr>
+      <a:lvl2pPr marL="685800" indent="-228600" algn="l" defTabSz="914400" rtl="0" eaLnBrk="1" latinLnBrk="0" hangingPunct="1">
+        <a:lnSpc>
+          <a:spcPct val="90000"/>
+        </a:lnSpc>
+        <a:spcBef>
+          <a:spcPts val="500"/>
+        </a:spcBef>
+        <a:buFont typeface="Arial" panose="020B0604020202020204" pitchFamily="34" charset="0"/>
+        <a:buChar char="•"/>
+        <a:defRPr sz="2400" kern="1200">
+          <a:solidFill>
+            <a:schemeClr val="tx1"/>
+          </a:solidFill>
+          <a:latin typeface="+mn-lt"/>
+          <a:ea typeface="+mn-ea"/>
+          <a:cs typeface="+mn-cs"/>
+        </a:defRPr>
+      </a:lvl2pPr>
+      <a:lvl3pPr marL="1143000" indent="-228600" algn="l" defTabSz="914400" rtl="0" eaLnBrk="1" latinLnBrk="0" hangingPunct="1">
+        <a:lnSpc>
+          <a:spcPct val="90000"/>
+        </a:lnSpc>
+        <a:spcBef>
+          <a:spcPts val="500"/>
+        </a:spcBef>
+        <a:buFont typeface="Arial" panose="020B0604020202020204" pitchFamily="34" charset="0"/>
+        <a:buChar char="•"/>
+        <a:defRPr sz="2000" kern="1200">
+          <a:solidFill>
+            <a:schemeClr val="tx1"/>
+          </a:solidFill>
+          <a:latin typeface="+mn-lt"/>
+          <a:ea typeface="+mn-ea"/>
+          <a:cs typeface="+mn-cs"/>
+        </a:defRPr>
+      </a:lvl3pPr>
+      <a:lvl4pPr marL="1600200" indent="-228600" algn="l" defTabSz="914400" rtl="0" eaLnBrk="1" latinLnBrk="0" hangingPunct="1">
+        <a:lnSpc>
+          <a:spcPct val="90000"/>
+        </a:lnSpc>
+        <a:spcBef>
+          <a:spcPts val="500"/>
+        </a:spcBef>
+        <a:buFont typeface="Arial" panose="020B0604020202020204" pitchFamily="34" charset="0"/>
+        <a:buChar char="•"/>
+        <a:defRPr sz="1800" kern="1200">
+          <a:solidFill>
+            <a:schemeClr val="tx1"/>
+          </a:solidFill>
+          <a:latin typeface="+mn-lt"/>
+          <a:ea typeface="+mn-ea"/>
+          <a:cs typeface="+mn-cs"/>
+        </a:defRPr>
+      </a:lvl4pPr>
+      <a:lvl5pPr marL="2057400" indent="-228600" algn="l" defTabSz="914400" rtl="0" eaLnBrk="1" latinLnBrk="0" hangingPunct="1">
+        <a:lnSpc>
+          <a:spcPct val="90000"/>
+        </a:lnSpc>
+        <a:spcBef>
+          <a:spcPts val="500"/>
+        </a:spcBef>
+        <a:buFont typeface="Arial" panose="020B0604020202020204" pitchFamily="34" charset="0"/>
+        <a:buChar char="•"/>
+        <a:defRPr sz="1800" kern="1200">
+          <a:solidFill>
+            <a:schemeClr val="tx1"/>
+          </a:solidFill>
+          <a:latin typeface="+mn-lt"/>
+          <a:ea typeface="+mn-ea"/>
+          <a:cs typeface="+mn-cs"/>
+        </a:defRPr>
+      </a:lvl5pPr>
+      <a:lvl6pPr marL="2514600" indent="-228600" algn="l" defTabSz="914400" rtl="0" eaLnBrk="1" latinLnBrk="0" hangingPunct="1">
+        <a:lnSpc>
+          <a:spcPct val="90000"/>
+        </a:lnSpc>
+        <a:spcBef>
+          <a:spcPts val="500"/>
+        </a:spcBef>
+        <a:buFont typeface="Arial" panose="020B0604020202020204" pitchFamily="34" charset="0"/>
+        <a:buChar char="•"/>
+        <a:defRPr sz="1800" kern="1200">
+          <a:solidFill>
+            <a:schemeClr val="tx1"/>
+          </a:solidFill>
+          <a:latin typeface="+mn-lt"/>
+          <a:ea typeface="+mn-ea"/>
+          <a:cs typeface="+mn-cs"/>
+        </a:defRPr>
+      </a:lvl6pPr>
+      <a:lvl7pPr marL="2971800" indent="-228600" algn="l" defTabSz="914400" rtl="0" eaLnBrk="1" latinLnBrk="0" hangingPunct="1">
+        <a:lnSpc>
+          <a:spcPct val="90000"/>
+        </a:lnSpc>
+        <a:spcBef>
+          <a:spcPts val="500"/>
+        </a:spcBef>
+        <a:buFont typeface="Arial" panose="020B0604020202020204" pitchFamily="34" charset="0"/>
+        <a:buChar char="•"/>
+        <a:defRPr sz="1800" kern="1200">
+          <a:solidFill>
+            <a:schemeClr val="tx1"/>
+          </a:solidFill>
+          <a:latin typeface="+mn-lt"/>
+          <a:ea typeface="+mn-ea"/>
+          <a:cs typeface="+mn-cs"/>
+        </a:defRPr>
+      </a:lvl7pPr>
+      <a:lvl8pPr marL="3429000" indent="-228600" algn="l" defTabSz="914400" rtl="0" eaLnBrk="1" latinLnBrk="0" hangingPunct="1">
+        <a:lnSpc>
+          <a:spcPct val="90000"/>
+        </a:lnSpc>
+        <a:spcBef>
+          <a:spcPts val="500"/>
+        </a:spcBef>
+        <a:buFont typeface="Arial" panose="020B0604020202020204" pitchFamily="34" charset="0"/>
+        <a:buChar char="•"/>
+        <a:defRPr sz="1800" kern="1200">
+          <a:solidFill>
+            <a:schemeClr val="tx1"/>
+          </a:solidFill>
+          <a:latin typeface="+mn-lt"/>
+          <a:ea typeface="+mn-ea"/>
+          <a:cs typeface="+mn-cs"/>
+        </a:defRPr>
+      </a:lvl8pPr>
+      <a:lvl9pPr marL="3886200" indent="-228600" algn="l" defTabSz="914400" rtl="0" eaLnBrk="1" latinLnBrk="0" hangingPunct="1">
+        <a:lnSpc>
+          <a:spcPct val="90000"/>
+        </a:lnSpc>
+        <a:spcBef>
+          <a:spcPts val="500"/>
+        </a:spcBef>
+        <a:buFont typeface="Arial" panose="020B0604020202020204" pitchFamily="34" charset="0"/>
+        <a:buChar char="•"/>
+        <a:defRPr sz="1800" kern="1200">
+          <a:solidFill>
+            <a:schemeClr val="tx1"/>
+          </a:solidFill>
+          <a:latin typeface="+mn-lt"/>
+          <a:ea typeface="+mn-ea"/>
+          <a:cs typeface="+mn-cs"/>
+        </a:defRPr>
+      </a:lvl9pPr>
+    </p:bodyStyle>
+    <p:otherStyle>
+      <a:defPPr>
+        <a:defRPr lang="en-US"/>
+      </a:defPPr>
+      <a:lvl1pPr marL="0" algn="l" defTabSz="914400" rtl="0" eaLnBrk="1" latinLnBrk="0" hangingPunct="1">
+        <a:defRPr sz="1800" kern="1200">
+          <a:solidFill>
+            <a:schemeClr val="tx1"/>
+          </a:solidFill>
+          <a:latin typeface="+mn-lt"/>
+          <a:ea typeface="+mn-ea"/>
+          <a:cs typeface="+mn-cs"/>
+        </a:defRPr>
+      </a:lvl1pPr>
+      <a:lvl2pPr marL="457200" algn="l" defTabSz="914400" rtl="0" eaLnBrk="1" latinLnBrk="0" hangingPunct="1">
+        <a:defRPr sz="1800" kern="1200">
+          <a:solidFill>
+            <a:schemeClr val="tx1"/>
+          </a:solidFill>
+          <a:latin typeface="+mn-lt"/>
+          <a:ea typeface="+mn-ea"/>
+          <a:cs typeface="+mn-cs"/>
+        </a:defRPr>
+      </a:lvl2pPr>
+      <a:lvl3pPr marL="914400" algn="l" defTabSz="914400" rtl="0" eaLnBrk="1" latinLnBrk="0" hangingPunct="1">
+        <a:defRPr sz="1800" kern="1200">
+          <a:solidFill>
+            <a:schemeClr val="tx1"/>
+          </a:solidFill>
+          <a:latin typeface="+mn-lt"/>
+          <a:ea typeface="+mn-ea"/>
+          <a:cs typeface="+mn-cs"/>
+        </a:defRPr>
+      </a:lvl3pPr>
+      <a:lvl4pPr marL="1371600" algn="l" defTabSz="914400" rtl="0" eaLnBrk="1" latinLnBrk="0" hangingPunct="1">
+        <a:defRPr sz="1800" kern="1200">
+          <a:solidFill>
+            <a:schemeClr val="tx1"/>
+          </a:solidFill>
+          <a:latin typeface="+mn-lt"/>
+          <a:ea typeface="+mn-ea"/>
+          <a:cs typeface="+mn-cs"/>
+        </a:defRPr>
+      </a:lvl4pPr>
+      <a:lvl5pPr marL="1828800" algn="l" defTabSz="914400" rtl="0" eaLnBrk="1" latinLnBrk="0" hangingPunct="1">
+        <a:defRPr sz="1800" kern="1200">
+          <a:solidFill>
+            <a:schemeClr val="tx1"/>
+          </a:solidFill>
+          <a:latin typeface="+mn-lt"/>
+          <a:ea typeface="+mn-ea"/>
+          <a:cs typeface="+mn-cs"/>
+        </a:defRPr>
+      </a:lvl5pPr>
+      <a:lvl6pPr marL="2286000" algn="l" defTabSz="914400" rtl="0" eaLnBrk="1" latinLnBrk="0" hangingPunct="1">
+        <a:defRPr sz="1800" kern="1200">
+          <a:solidFill>
+            <a:schemeClr val="tx1"/>
+          </a:solidFill>
+          <a:latin typeface="+mn-lt"/>
+          <a:ea typeface="+mn-ea"/>
+          <a:cs typeface="+mn-cs"/>
+        </a:defRPr>
+      </a:lvl6pPr>
+      <a:lvl7pPr marL="2743200" algn="l" defTabSz="914400" rtl="0" eaLnBrk="1" latinLnBrk="0" hangingPunct="1">
+        <a:defRPr sz="1800" kern="1200">
+          <a:solidFill>
+            <a:schemeClr val="tx1"/>
+          </a:solidFill>
+          <a:latin typeface="+mn-lt"/>
+          <a:ea typeface="+mn-ea"/>
+          <a:cs typeface="+mn-cs"/>
+        </a:defRPr>
+      </a:lvl7pPr>
+      <a:lvl8pPr marL="3200400" algn="l" defTabSz="914400" rtl="0" eaLnBrk="1" latinLnBrk="0" hangingPunct="1">
+        <a:defRPr sz="1800" kern="1200">
+          <a:solidFill>
+            <a:schemeClr val="tx1"/>
+          </a:solidFill>
+          <a:latin typeface="+mn-lt"/>
+          <a:ea typeface="+mn-ea"/>
+          <a:cs typeface="+mn-cs"/>
+        </a:defRPr>
+      </a:lvl8pPr>
+      <a:lvl9pPr marL="3657600" algn="l" defTabSz="914400" rtl="0" eaLnBrk="1" latinLnBrk="0" hangingPunct="1">
+        <a:defRPr sz="1800" kern="1200">
+          <a:solidFill>
+            <a:schemeClr val="tx1"/>
+          </a:solidFill>
+          <a:latin typeface="+mn-lt"/>
+          <a:ea typeface="+mn-ea"/>
+          <a:cs typeface="+mn-cs"/>
+        </a:defRPr>
+      </a:lvl9pPr>
+    </p:otherStyle>
+  </p:txStyles>
 </p:sldMaster>
 </file>
 
 <file path=ppt/slides/slide1.xml><?xml version="1.0" encoding="utf-8"?>
-<p:sld xmlns:a="http://schemas.openxmlformats.org/drawingml/2006/main" xmlns:p="http://schemas.openxmlformats.org/presentationml/2006/main" xmlns:r="http://schemas.openxmlformats.org/officeDocument/2006/relationships" xmlns:p14="http://schemas.microsoft.com/office/powerpoint/2010/main" xmlns:p15="http://schemas.microsoft.com/office/powerpoint/2012/main" xmlns:mc="http://schemas.openxmlformats.org/markup-compatibility/2006">
+<p:sld xmlns:a="http://schemas.openxmlformats.org/drawingml/2006/main" xmlns:r="http://schemas.openxmlformats.org/officeDocument/2006/relationships" xmlns:p="http://schemas.openxmlformats.org/presentationml/2006/main">
   <p:cSld>
     <p:spTree>
       <p:nvGrpSpPr>
@@ -3089,7 +3501,7 @@
       </p:grpSpPr>
       <p:grpSp>
         <p:nvGrpSpPr>
-          <p:cNvPr id="41" name=""/>
+          <p:cNvPr id="41" name="Group 40"/>
           <p:cNvGrpSpPr/>
           <p:nvPr/>
         </p:nvGrpSpPr>
@@ -3118,11 +3530,11 @@
               </a:avLst>
             </a:prstGeom>
             <a:solidFill>
-              <a:srgbClr val="a5a5a5"/>
+              <a:srgbClr val="A5A5A5"/>
             </a:solidFill>
             <a:ln>
               <a:solidFill>
-                <a:srgbClr val="7a7a7a"/>
+                <a:srgbClr val="7A7A7A"/>
               </a:solidFill>
             </a:ln>
           </p:spPr>
@@ -3156,6 +3568,7 @@
               <a:avLst/>
               <a:gdLst/>
               <a:ahLst/>
+              <a:cxnLst/>
               <a:rect l="l" t="t" r="r" b="b"/>
               <a:pathLst>
                 <a:path w="21600" h="21600">
@@ -3171,9 +3584,9 @@
             <a:noFill/>
             <a:ln w="57150">
               <a:solidFill>
-                <a:srgbClr val="ff0000"/>
-              </a:solidFill>
-              <a:tailEnd len="med" type="triangle" w="med"/>
+                <a:srgbClr val="FF0000"/>
+              </a:solidFill>
+              <a:tailEnd type="triangle" w="med" len="med"/>
             </a:ln>
           </p:spPr>
           <p:style>
@@ -3204,6 +3617,7 @@
               <a:avLst/>
               <a:gdLst/>
               <a:ahLst/>
+              <a:cxnLst/>
               <a:rect l="l" t="t" r="r" b="b"/>
               <a:pathLst>
                 <a:path w="21600" h="21600">
@@ -3219,9 +3633,9 @@
             <a:noFill/>
             <a:ln w="57150">
               <a:solidFill>
-                <a:srgbClr val="ff0000"/>
-              </a:solidFill>
-              <a:headEnd len="med" type="triangle" w="med"/>
+                <a:srgbClr val="FF0000"/>
+              </a:solidFill>
+              <a:headEnd type="triangle" w="med" len="med"/>
             </a:ln>
           </p:spPr>
           <p:style>
@@ -3252,11 +3666,11 @@
               <a:avLst/>
             </a:prstGeom>
             <a:solidFill>
-              <a:srgbClr val="ffc000"/>
+              <a:srgbClr val="FFC000"/>
             </a:solidFill>
             <a:ln>
               <a:solidFill>
-                <a:srgbClr val="bc8e00"/>
+                <a:srgbClr val="BC8E00"/>
               </a:solidFill>
             </a:ln>
           </p:spPr>
@@ -3294,10 +3708,10 @@
             <a:gradFill rotWithShape="0">
               <a:gsLst>
                 <a:gs pos="0">
-                  <a:srgbClr val="d1d1d1"/>
+                  <a:srgbClr val="D1D1D1"/>
                 </a:gs>
                 <a:gs pos="100000">
-                  <a:srgbClr val="c7c7c7"/>
+                  <a:srgbClr val="C7C7C7"/>
                 </a:gs>
               </a:gsLst>
               <a:lin ang="0"/>
@@ -3340,10 +3754,10 @@
             <a:gradFill rotWithShape="0">
               <a:gsLst>
                 <a:gs pos="0">
-                  <a:srgbClr val="d1d1d1"/>
+                  <a:srgbClr val="D1D1D1"/>
                 </a:gs>
                 <a:gs pos="100000">
-                  <a:srgbClr val="c7c7c7"/>
+                  <a:srgbClr val="C7C7C7"/>
                 </a:gs>
               </a:gsLst>
               <a:lin ang="0"/>
@@ -3386,10 +3800,10 @@
             <a:gradFill rotWithShape="0">
               <a:gsLst>
                 <a:gs pos="0">
-                  <a:srgbClr val="d1d1d1"/>
+                  <a:srgbClr val="D1D1D1"/>
                 </a:gs>
                 <a:gs pos="100000">
-                  <a:srgbClr val="c7c7c7"/>
+                  <a:srgbClr val="C7C7C7"/>
                 </a:gs>
               </a:gsLst>
               <a:lin ang="0"/>
@@ -3429,7 +3843,7 @@
             </a:prstGeom>
             <a:ln w="38100">
               <a:solidFill>
-                <a:srgbClr val="4472c4"/>
+                <a:srgbClr val="4472C4"/>
               </a:solidFill>
             </a:ln>
           </p:spPr>
@@ -3465,7 +3879,7 @@
               </a:avLst>
             </a:prstGeom>
             <a:solidFill>
-              <a:srgbClr val="4472c4"/>
+              <a:srgbClr val="4472C4"/>
             </a:solidFill>
             <a:ln>
               <a:solidFill>
@@ -3507,7 +3921,7 @@
               </a:avLst>
             </a:prstGeom>
             <a:solidFill>
-              <a:srgbClr val="4472c4"/>
+              <a:srgbClr val="4472C4"/>
             </a:solidFill>
             <a:ln>
               <a:solidFill>
@@ -3549,7 +3963,7 @@
               </a:avLst>
             </a:prstGeom>
             <a:solidFill>
-              <a:srgbClr val="4472c4"/>
+              <a:srgbClr val="4472C4"/>
             </a:solidFill>
             <a:ln>
               <a:solidFill>
@@ -3587,6 +4001,7 @@
               <a:avLst/>
               <a:gdLst/>
               <a:ahLst/>
+              <a:cxnLst/>
               <a:rect l="l" t="t" r="r" b="b"/>
               <a:pathLst>
                 <a:path w="21600" h="21600">
@@ -3604,8 +4019,8 @@
               <a:solidFill>
                 <a:srgbClr val="000000"/>
               </a:solidFill>
-              <a:headEnd len="med" type="triangle" w="med"/>
-              <a:tailEnd len="med" type="triangle" w="med"/>
+              <a:headEnd type="triangle" w="med" len="med"/>
+              <a:tailEnd type="triangle" w="med" len="med"/>
             </a:ln>
           </p:spPr>
           <p:style>
@@ -3641,15 +4056,22 @@
             </a:ln>
           </p:spPr>
           <p:style>
-            <a:lnRef idx="0"/>
-            <a:fillRef idx="0"/>
-            <a:effectRef idx="0"/>
+            <a:lnRef idx="0">
+              <a:scrgbClr r="0" g="0" b="0"/>
+            </a:lnRef>
+            <a:fillRef idx="0">
+              <a:scrgbClr r="0" g="0" b="0"/>
+            </a:fillRef>
+            <a:effectRef idx="0">
+              <a:scrgbClr r="0" g="0" b="0"/>
+            </a:effectRef>
             <a:fontRef idx="minor"/>
           </p:style>
           <p:txBody>
-            <a:bodyPr lIns="90000" rIns="90000" tIns="45000" bIns="45000" anchor="t">
+            <a:bodyPr lIns="90000" tIns="45000" rIns="90000" bIns="45000" anchor="t">
               <a:spAutoFit/>
             </a:bodyPr>
+            <a:lstStyle/>
             <a:p>
               <a:pPr>
                 <a:lnSpc>
@@ -3658,7 +4080,7 @@
                 <a:buNone/>
               </a:pPr>
               <a:r>
-                <a:rPr b="1" lang="en-US" sz="1200" spc="-1" strike="noStrike">
+                <a:rPr lang="en-US" sz="1200" b="1" strike="noStrike" spc="-1">
                   <a:solidFill>
                     <a:srgbClr val="000000"/>
                   </a:solidFill>
@@ -3666,7 +4088,7 @@
                 </a:rPr>
                 <a:t>172.5 cm</a:t>
               </a:r>
-              <a:endParaRPr b="0" lang="en-US" sz="1200" spc="-1" strike="noStrike">
+              <a:endParaRPr lang="en-US" sz="1200" b="0" strike="noStrike" spc="-1">
                 <a:latin typeface="Arial"/>
               </a:endParaRPr>
             </a:p>
@@ -3687,6 +4109,7 @@
               <a:avLst/>
               <a:gdLst/>
               <a:ahLst/>
+              <a:cxnLst/>
               <a:rect l="l" t="t" r="r" b="b"/>
               <a:pathLst>
                 <a:path w="21600" h="21600">
@@ -3704,8 +4127,8 @@
               <a:solidFill>
                 <a:srgbClr val="000000"/>
               </a:solidFill>
-              <a:headEnd len="med" type="triangle" w="med"/>
-              <a:tailEnd len="med" type="triangle" w="med"/>
+              <a:headEnd type="triangle" w="med" len="med"/>
+              <a:tailEnd type="triangle" w="med" len="med"/>
             </a:ln>
           </p:spPr>
           <p:style>
@@ -3741,15 +4164,22 @@
             </a:ln>
           </p:spPr>
           <p:style>
-            <a:lnRef idx="0"/>
-            <a:fillRef idx="0"/>
-            <a:effectRef idx="0"/>
+            <a:lnRef idx="0">
+              <a:scrgbClr r="0" g="0" b="0"/>
+            </a:lnRef>
+            <a:fillRef idx="0">
+              <a:scrgbClr r="0" g="0" b="0"/>
+            </a:fillRef>
+            <a:effectRef idx="0">
+              <a:scrgbClr r="0" g="0" b="0"/>
+            </a:effectRef>
             <a:fontRef idx="minor"/>
           </p:style>
           <p:txBody>
-            <a:bodyPr lIns="90000" rIns="90000" tIns="45000" bIns="45000" anchor="t">
+            <a:bodyPr lIns="90000" tIns="45000" rIns="90000" bIns="45000" anchor="t">
               <a:spAutoFit/>
             </a:bodyPr>
+            <a:lstStyle/>
             <a:p>
               <a:pPr>
                 <a:lnSpc>
@@ -3758,7 +4188,7 @@
                 <a:buNone/>
               </a:pPr>
               <a:r>
-                <a:rPr b="1" lang="en-US" sz="1200" spc="-1" strike="noStrike">
+                <a:rPr lang="en-US" sz="1200" b="1" strike="noStrike" spc="-1">
                   <a:solidFill>
                     <a:srgbClr val="000000"/>
                   </a:solidFill>
@@ -3766,7 +4196,7 @@
                 </a:rPr>
                 <a:t>7.5 cm</a:t>
               </a:r>
-              <a:endParaRPr b="0" lang="en-US" sz="1200" spc="-1" strike="noStrike">
+              <a:endParaRPr lang="en-US" sz="1200" b="0" strike="noStrike" spc="-1">
                 <a:latin typeface="Arial"/>
               </a:endParaRPr>
             </a:p>
@@ -3787,6 +4217,7 @@
               <a:avLst/>
               <a:gdLst/>
               <a:ahLst/>
+              <a:cxnLst/>
               <a:rect l="l" t="t" r="r" b="b"/>
               <a:pathLst>
                 <a:path w="21600" h="21600">
@@ -3804,8 +4235,8 @@
               <a:solidFill>
                 <a:srgbClr val="000000"/>
               </a:solidFill>
-              <a:headEnd len="med" type="triangle" w="med"/>
-              <a:tailEnd len="med" type="triangle" w="med"/>
+              <a:headEnd type="triangle" w="med" len="med"/>
+              <a:tailEnd type="triangle" w="med" len="med"/>
             </a:ln>
           </p:spPr>
           <p:style>
@@ -3836,6 +4267,7 @@
               <a:avLst/>
               <a:gdLst/>
               <a:ahLst/>
+              <a:cxnLst/>
               <a:rect l="l" t="t" r="r" b="b"/>
               <a:pathLst>
                 <a:path w="21600" h="21600">
@@ -3853,8 +4285,8 @@
               <a:solidFill>
                 <a:srgbClr val="000000"/>
               </a:solidFill>
-              <a:headEnd len="med" type="triangle" w="med"/>
-              <a:tailEnd len="med" type="triangle" w="med"/>
+              <a:headEnd type="triangle" w="med" len="med"/>
+              <a:tailEnd type="triangle" w="med" len="med"/>
             </a:ln>
           </p:spPr>
           <p:style>
@@ -3890,15 +4322,22 @@
             </a:ln>
           </p:spPr>
           <p:style>
-            <a:lnRef idx="0"/>
-            <a:fillRef idx="0"/>
-            <a:effectRef idx="0"/>
+            <a:lnRef idx="0">
+              <a:scrgbClr r="0" g="0" b="0"/>
+            </a:lnRef>
+            <a:fillRef idx="0">
+              <a:scrgbClr r="0" g="0" b="0"/>
+            </a:fillRef>
+            <a:effectRef idx="0">
+              <a:scrgbClr r="0" g="0" b="0"/>
+            </a:effectRef>
             <a:fontRef idx="minor"/>
           </p:style>
           <p:txBody>
-            <a:bodyPr lIns="90000" rIns="90000" tIns="45000" bIns="45000" anchor="t">
+            <a:bodyPr lIns="90000" tIns="45000" rIns="90000" bIns="45000" anchor="t">
               <a:spAutoFit/>
             </a:bodyPr>
+            <a:lstStyle/>
             <a:p>
               <a:pPr>
                 <a:lnSpc>
@@ -3907,7 +4346,7 @@
                 <a:buNone/>
               </a:pPr>
               <a:r>
-                <a:rPr b="1" lang="en-US" sz="1200" spc="-1" strike="noStrike">
+                <a:rPr lang="en-US" sz="1200" b="1" strike="noStrike" spc="-1">
                   <a:solidFill>
                     <a:srgbClr val="000000"/>
                   </a:solidFill>
@@ -3915,7 +4354,7 @@
                 </a:rPr>
                 <a:t>8 mm</a:t>
               </a:r>
-              <a:endParaRPr b="0" lang="en-US" sz="1200" spc="-1" strike="noStrike">
+              <a:endParaRPr lang="en-US" sz="1200" b="0" strike="noStrike" spc="-1">
                 <a:latin typeface="Arial"/>
               </a:endParaRPr>
             </a:p>
@@ -3941,15 +4380,22 @@
             </a:ln>
           </p:spPr>
           <p:style>
-            <a:lnRef idx="0"/>
-            <a:fillRef idx="0"/>
-            <a:effectRef idx="0"/>
+            <a:lnRef idx="0">
+              <a:scrgbClr r="0" g="0" b="0"/>
+            </a:lnRef>
+            <a:fillRef idx="0">
+              <a:scrgbClr r="0" g="0" b="0"/>
+            </a:fillRef>
+            <a:effectRef idx="0">
+              <a:scrgbClr r="0" g="0" b="0"/>
+            </a:effectRef>
             <a:fontRef idx="minor"/>
           </p:style>
           <p:txBody>
-            <a:bodyPr lIns="90000" rIns="90000" tIns="45000" bIns="45000" anchor="t">
+            <a:bodyPr lIns="90000" tIns="45000" rIns="90000" bIns="45000" anchor="t">
               <a:spAutoFit/>
             </a:bodyPr>
+            <a:lstStyle/>
             <a:p>
               <a:pPr>
                 <a:lnSpc>
@@ -3958,7 +4404,7 @@
                 <a:buNone/>
               </a:pPr>
               <a:r>
-                <a:rPr b="1" lang="en-US" sz="1200" spc="-1" strike="noStrike">
+                <a:rPr lang="en-US" sz="1200" b="1" strike="noStrike" spc="-1">
                   <a:solidFill>
                     <a:srgbClr val="000000"/>
                   </a:solidFill>
@@ -3966,7 +4412,7 @@
                 </a:rPr>
                 <a:t>8 mm</a:t>
               </a:r>
-              <a:endParaRPr b="0" lang="en-US" sz="1200" spc="-1" strike="noStrike">
+              <a:endParaRPr lang="en-US" sz="1200" b="0" strike="noStrike" spc="-1">
                 <a:latin typeface="Arial"/>
               </a:endParaRPr>
             </a:p>
@@ -3987,6 +4433,7 @@
               <a:avLst/>
               <a:gdLst/>
               <a:ahLst/>
+              <a:cxnLst/>
               <a:rect l="l" t="t" r="r" b="b"/>
               <a:pathLst>
                 <a:path w="21600" h="21600">
@@ -4004,8 +4451,8 @@
               <a:solidFill>
                 <a:srgbClr val="000000"/>
               </a:solidFill>
-              <a:headEnd len="med" type="triangle" w="med"/>
-              <a:tailEnd len="med" type="triangle" w="med"/>
+              <a:headEnd type="triangle" w="med" len="med"/>
+              <a:tailEnd type="triangle" w="med" len="med"/>
             </a:ln>
           </p:spPr>
           <p:style>
@@ -4041,15 +4488,22 @@
             </a:ln>
           </p:spPr>
           <p:style>
-            <a:lnRef idx="0"/>
-            <a:fillRef idx="0"/>
-            <a:effectRef idx="0"/>
+            <a:lnRef idx="0">
+              <a:scrgbClr r="0" g="0" b="0"/>
+            </a:lnRef>
+            <a:fillRef idx="0">
+              <a:scrgbClr r="0" g="0" b="0"/>
+            </a:fillRef>
+            <a:effectRef idx="0">
+              <a:scrgbClr r="0" g="0" b="0"/>
+            </a:effectRef>
             <a:fontRef idx="minor"/>
           </p:style>
           <p:txBody>
-            <a:bodyPr lIns="90000" rIns="90000" tIns="45000" bIns="45000" anchor="t">
+            <a:bodyPr lIns="90000" tIns="45000" rIns="90000" bIns="45000" anchor="t">
               <a:spAutoFit/>
             </a:bodyPr>
+            <a:lstStyle/>
             <a:p>
               <a:pPr>
                 <a:lnSpc>
@@ -4058,7 +4512,7 @@
                 <a:buNone/>
               </a:pPr>
               <a:r>
-                <a:rPr b="1" lang="en-US" sz="1200" spc="-1" strike="noStrike">
+                <a:rPr lang="en-US" sz="1200" b="1" strike="noStrike" spc="-1">
                   <a:solidFill>
                     <a:srgbClr val="000000"/>
                   </a:solidFill>
@@ -4066,7 +4520,7 @@
                 </a:rPr>
                 <a:t>4.45 cm</a:t>
               </a:r>
-              <a:endParaRPr b="0" lang="en-US" sz="1200" spc="-1" strike="noStrike">
+              <a:endParaRPr lang="en-US" sz="1200" b="0" strike="noStrike" spc="-1">
                 <a:latin typeface="Arial"/>
               </a:endParaRPr>
             </a:p>
@@ -4092,15 +4546,22 @@
             </a:ln>
           </p:spPr>
           <p:style>
-            <a:lnRef idx="0"/>
-            <a:fillRef idx="0"/>
-            <a:effectRef idx="0"/>
+            <a:lnRef idx="0">
+              <a:scrgbClr r="0" g="0" b="0"/>
+            </a:lnRef>
+            <a:fillRef idx="0">
+              <a:scrgbClr r="0" g="0" b="0"/>
+            </a:fillRef>
+            <a:effectRef idx="0">
+              <a:scrgbClr r="0" g="0" b="0"/>
+            </a:effectRef>
             <a:fontRef idx="minor"/>
           </p:style>
           <p:txBody>
-            <a:bodyPr lIns="90000" rIns="90000" tIns="45000" bIns="45000" anchor="t">
+            <a:bodyPr lIns="90000" tIns="45000" rIns="90000" bIns="45000" anchor="t">
               <a:spAutoFit/>
             </a:bodyPr>
+            <a:lstStyle/>
             <a:p>
               <a:pPr>
                 <a:lnSpc>
@@ -4109,7 +4570,7 @@
                 <a:buNone/>
               </a:pPr>
               <a:r>
-                <a:rPr b="1" lang="en-US" sz="1800" spc="-1" strike="noStrike">
+                <a:rPr lang="en-US" sz="1800" b="1" strike="noStrike" spc="-1">
                   <a:solidFill>
                     <a:srgbClr val="000000"/>
                   </a:solidFill>
@@ -4117,7 +4578,7 @@
                 </a:rPr>
                 <a:t>IP</a:t>
               </a:r>
-              <a:endParaRPr b="0" lang="en-US" sz="1800" spc="-1" strike="noStrike">
+              <a:endParaRPr lang="en-US" sz="1800" b="0" strike="noStrike" spc="-1">
                 <a:latin typeface="Arial"/>
               </a:endParaRPr>
             </a:p>
@@ -4125,7 +4586,7 @@
         </p:sp>
         <p:sp>
           <p:nvSpPr>
-            <p:cNvPr id="64" name=""/>
+            <p:cNvPr id="64" name="Straight Connector 63"/>
             <p:cNvSpPr/>
             <p:nvPr/>
           </p:nvSpPr>
@@ -4148,28 +4609,29 @@
             </a:ln>
           </p:spPr>
           <p:style>
-            <a:lnRef idx="0"/>
-            <a:fillRef idx="0"/>
-            <a:effectRef idx="0"/>
+            <a:lnRef idx="0">
+              <a:scrgbClr r="0" g="0" b="0"/>
+            </a:lnRef>
+            <a:fillRef idx="0">
+              <a:scrgbClr r="0" g="0" b="0"/>
+            </a:fillRef>
+            <a:effectRef idx="0">
+              <a:scrgbClr r="0" g="0" b="0"/>
+            </a:effectRef>
             <a:fontRef idx="minor"/>
           </p:style>
         </p:sp>
       </p:grpSp>
     </p:spTree>
   </p:cSld>
-  <mc:AlternateContent>
-    <mc:Choice Requires="p14">
-      <p:transition spd="slow" p14:dur="2000"/>
-    </mc:Choice>
-    <mc:Fallback>
-      <p:transition spd="slow"/>
-    </mc:Fallback>
-  </mc:AlternateContent>
+  <p:clrMapOvr>
+    <a:masterClrMapping/>
+  </p:clrMapOvr>
 </p:sld>
 </file>
 
 <file path=ppt/slides/slide2.xml><?xml version="1.0" encoding="utf-8"?>
-<p:sld xmlns:a="http://schemas.openxmlformats.org/drawingml/2006/main" xmlns:p="http://schemas.openxmlformats.org/presentationml/2006/main" xmlns:r="http://schemas.openxmlformats.org/officeDocument/2006/relationships" xmlns:p14="http://schemas.microsoft.com/office/powerpoint/2010/main" xmlns:p15="http://schemas.microsoft.com/office/powerpoint/2012/main" xmlns:mc="http://schemas.openxmlformats.org/markup-compatibility/2006">
+<p:sld xmlns:a="http://schemas.openxmlformats.org/drawingml/2006/main" xmlns:r="http://schemas.openxmlformats.org/officeDocument/2006/relationships" xmlns:p="http://schemas.openxmlformats.org/presentationml/2006/main">
   <p:cSld>
     <p:spTree>
       <p:nvGrpSpPr>
@@ -4216,11 +4678,11 @@
               </a:avLst>
             </a:prstGeom>
             <a:solidFill>
-              <a:srgbClr val="a5a5a5"/>
+              <a:srgbClr val="A5A5A5"/>
             </a:solidFill>
             <a:ln>
               <a:solidFill>
-                <a:srgbClr val="7a7a7a"/>
+                <a:srgbClr val="7A7A7A"/>
               </a:solidFill>
             </a:ln>
           </p:spPr>
@@ -4254,6 +4716,7 @@
               <a:avLst/>
               <a:gdLst/>
               <a:ahLst/>
+              <a:cxnLst/>
               <a:rect l="l" t="t" r="r" b="b"/>
               <a:pathLst>
                 <a:path w="21600" h="21600">
@@ -4269,9 +4732,9 @@
             <a:noFill/>
             <a:ln w="57150">
               <a:solidFill>
-                <a:srgbClr val="ff0000"/>
-              </a:solidFill>
-              <a:tailEnd len="med" type="triangle" w="med"/>
+                <a:srgbClr val="FF0000"/>
+              </a:solidFill>
+              <a:tailEnd type="triangle" w="med" len="med"/>
             </a:ln>
           </p:spPr>
           <p:style>
@@ -4302,6 +4765,7 @@
               <a:avLst/>
               <a:gdLst/>
               <a:ahLst/>
+              <a:cxnLst/>
               <a:rect l="l" t="t" r="r" b="b"/>
               <a:pathLst>
                 <a:path w="21600" h="21600">
@@ -4317,9 +4781,9 @@
             <a:noFill/>
             <a:ln w="57150">
               <a:solidFill>
-                <a:srgbClr val="ff0000"/>
-              </a:solidFill>
-              <a:headEnd len="med" type="triangle" w="med"/>
+                <a:srgbClr val="FF0000"/>
+              </a:solidFill>
+              <a:headEnd type="triangle" w="med" len="med"/>
             </a:ln>
           </p:spPr>
           <p:style>
@@ -4350,11 +4814,11 @@
               <a:avLst/>
             </a:prstGeom>
             <a:solidFill>
-              <a:srgbClr val="ffc000"/>
+              <a:srgbClr val="FFC000"/>
             </a:solidFill>
             <a:ln>
               <a:solidFill>
-                <a:srgbClr val="bc8e00"/>
+                <a:srgbClr val="BC8E00"/>
               </a:solidFill>
             </a:ln>
           </p:spPr>
@@ -4392,10 +4856,10 @@
             <a:gradFill rotWithShape="0">
               <a:gsLst>
                 <a:gs pos="0">
-                  <a:srgbClr val="d1d1d1"/>
+                  <a:srgbClr val="D1D1D1"/>
                 </a:gs>
                 <a:gs pos="100000">
-                  <a:srgbClr val="c7c7c7"/>
+                  <a:srgbClr val="C7C7C7"/>
                 </a:gs>
               </a:gsLst>
               <a:lin ang="0"/>
@@ -4438,10 +4902,10 @@
             <a:gradFill rotWithShape="0">
               <a:gsLst>
                 <a:gs pos="0">
-                  <a:srgbClr val="d1d1d1"/>
+                  <a:srgbClr val="D1D1D1"/>
                 </a:gs>
                 <a:gs pos="100000">
-                  <a:srgbClr val="c7c7c7"/>
+                  <a:srgbClr val="C7C7C7"/>
                 </a:gs>
               </a:gsLst>
               <a:lin ang="0"/>
@@ -4484,10 +4948,10 @@
             <a:gradFill rotWithShape="0">
               <a:gsLst>
                 <a:gs pos="0">
-                  <a:srgbClr val="d1d1d1"/>
+                  <a:srgbClr val="D1D1D1"/>
                 </a:gs>
                 <a:gs pos="100000">
-                  <a:srgbClr val="c7c7c7"/>
+                  <a:srgbClr val="C7C7C7"/>
                 </a:gs>
               </a:gsLst>
               <a:lin ang="0"/>
@@ -4527,7 +4991,7 @@
             </a:prstGeom>
             <a:ln w="38100">
               <a:solidFill>
-                <a:srgbClr val="00b050"/>
+                <a:srgbClr val="00B050"/>
               </a:solidFill>
             </a:ln>
           </p:spPr>
@@ -4563,7 +5027,7 @@
               </a:avLst>
             </a:prstGeom>
             <a:solidFill>
-              <a:srgbClr val="00b050"/>
+              <a:srgbClr val="00B050"/>
             </a:solidFill>
             <a:ln w="6350">
               <a:solidFill>
@@ -4605,7 +5069,7 @@
               </a:avLst>
             </a:prstGeom>
             <a:solidFill>
-              <a:srgbClr val="00b050"/>
+              <a:srgbClr val="00B050"/>
             </a:solidFill>
             <a:ln w="6350">
               <a:solidFill>
@@ -4658,7 +5122,7 @@
               </a:prstGeom>
               <a:ln w="31750">
                 <a:solidFill>
-                  <a:srgbClr val="ff0000"/>
+                  <a:srgbClr val="FF0000"/>
                 </a:solidFill>
                 <a:prstDash val="sysDash"/>
               </a:ln>
@@ -4695,7 +5159,7 @@
                 </a:avLst>
               </a:prstGeom>
               <a:solidFill>
-                <a:srgbClr val="ff0000"/>
+                <a:srgbClr val="FF0000"/>
               </a:solidFill>
               <a:ln w="6350">
                 <a:solidFill>
@@ -4737,7 +5201,7 @@
                 </a:avLst>
               </a:prstGeom>
               <a:solidFill>
-                <a:srgbClr val="ff0000"/>
+                <a:srgbClr val="FF0000"/>
               </a:solidFill>
               <a:ln w="6350">
                 <a:solidFill>
@@ -4779,7 +5243,7 @@
                 </a:avLst>
               </a:prstGeom>
               <a:solidFill>
-                <a:srgbClr val="ff0000"/>
+                <a:srgbClr val="FF0000"/>
               </a:solidFill>
               <a:ln w="6350">
                 <a:solidFill>
@@ -4819,7 +5283,7 @@
             </a:prstGeom>
             <a:ln w="38100">
               <a:solidFill>
-                <a:srgbClr val="00b050"/>
+                <a:srgbClr val="00B050"/>
               </a:solidFill>
             </a:ln>
           </p:spPr>
@@ -4856,15 +5320,22 @@
             </a:ln>
           </p:spPr>
           <p:style>
-            <a:lnRef idx="0"/>
-            <a:fillRef idx="0"/>
-            <a:effectRef idx="0"/>
+            <a:lnRef idx="0">
+              <a:scrgbClr r="0" g="0" b="0"/>
+            </a:lnRef>
+            <a:fillRef idx="0">
+              <a:scrgbClr r="0" g="0" b="0"/>
+            </a:fillRef>
+            <a:effectRef idx="0">
+              <a:scrgbClr r="0" g="0" b="0"/>
+            </a:effectRef>
             <a:fontRef idx="minor"/>
           </p:style>
           <p:txBody>
-            <a:bodyPr lIns="90000" rIns="90000" tIns="45000" bIns="45000" anchor="t">
+            <a:bodyPr lIns="90000" tIns="45000" rIns="90000" bIns="45000" anchor="t">
               <a:spAutoFit/>
             </a:bodyPr>
+            <a:lstStyle/>
             <a:p>
               <a:pPr>
                 <a:lnSpc>
@@ -4873,7 +5344,7 @@
                 <a:buNone/>
               </a:pPr>
               <a:r>
-                <a:rPr b="1" lang="en-US" sz="1800" spc="-1" strike="noStrike">
+                <a:rPr lang="en-US" sz="1800" b="1" strike="noStrike" spc="-1">
                   <a:solidFill>
                     <a:srgbClr val="000000"/>
                   </a:solidFill>
@@ -4881,7 +5352,7 @@
                 </a:rPr>
                 <a:t>IP</a:t>
               </a:r>
-              <a:endParaRPr b="0" lang="en-US" sz="1800" spc="-1" strike="noStrike">
+              <a:endParaRPr lang="en-US" sz="1800" b="0" strike="noStrike" spc="-1">
                 <a:latin typeface="Arial"/>
               </a:endParaRPr>
             </a:p>
@@ -4906,7 +5377,7 @@
               </a:avLst>
             </a:prstGeom>
             <a:solidFill>
-              <a:srgbClr val="00b050"/>
+              <a:srgbClr val="00B050"/>
             </a:solidFill>
             <a:ln w="6350">
               <a:solidFill>
@@ -4932,14 +5403,742 @@
       </p:grpSp>
     </p:spTree>
   </p:cSld>
-  <mc:AlternateContent>
-    <mc:Choice Requires="p14">
-      <p:transition spd="slow" p14:dur="2000"/>
-    </mc:Choice>
-    <mc:Fallback>
-      <p:transition spd="slow"/>
-    </mc:Fallback>
-  </mc:AlternateContent>
+  <p:clrMapOvr>
+    <a:masterClrMapping/>
+  </p:clrMapOvr>
+</p:sld>
+</file>
+
+<file path=ppt/slides/slide3.xml><?xml version="1.0" encoding="utf-8"?>
+<p:sld xmlns:a="http://schemas.openxmlformats.org/drawingml/2006/main" xmlns:r="http://schemas.openxmlformats.org/officeDocument/2006/relationships" xmlns:p="http://schemas.openxmlformats.org/presentationml/2006/main">
+  <p:cSld>
+    <p:spTree>
+      <p:nvGrpSpPr>
+        <p:cNvPr id="1" name=""/>
+        <p:cNvGrpSpPr/>
+        <p:nvPr/>
+      </p:nvGrpSpPr>
+      <p:grpSpPr>
+        <a:xfrm>
+          <a:off x="0" y="0"/>
+          <a:ext cx="0" cy="0"/>
+          <a:chOff x="0" y="0"/>
+          <a:chExt cx="0" cy="0"/>
+        </a:xfrm>
+      </p:grpSpPr>
+      <p:sp>
+        <p:nvSpPr>
+          <p:cNvPr id="66" name="Cylinder 2"/>
+          <p:cNvSpPr/>
+          <p:nvPr/>
+        </p:nvSpPr>
+        <p:spPr>
+          <a:xfrm rot="5400000">
+            <a:off x="1642902" y="-156420"/>
+            <a:ext cx="279720" cy="3431160"/>
+          </a:xfrm>
+          <a:prstGeom prst="can">
+            <a:avLst>
+              <a:gd name="adj" fmla="val 50926"/>
+            </a:avLst>
+          </a:prstGeom>
+          <a:solidFill>
+            <a:srgbClr val="A5A5A5"/>
+          </a:solidFill>
+          <a:ln>
+            <a:solidFill>
+              <a:srgbClr val="7A7A7A"/>
+            </a:solidFill>
+          </a:ln>
+        </p:spPr>
+        <p:style>
+          <a:lnRef idx="2">
+            <a:schemeClr val="accent3">
+              <a:shade val="50000"/>
+            </a:schemeClr>
+          </a:lnRef>
+          <a:fillRef idx="1">
+            <a:schemeClr val="accent3"/>
+          </a:fillRef>
+          <a:effectRef idx="0">
+            <a:schemeClr val="accent3"/>
+          </a:effectRef>
+          <a:fontRef idx="minor"/>
+        </p:style>
+      </p:sp>
+      <p:sp>
+        <p:nvSpPr>
+          <p:cNvPr id="67" name="Straight Arrow Connector 3"/>
+          <p:cNvSpPr/>
+          <p:nvPr/>
+        </p:nvSpPr>
+        <p:spPr>
+          <a:xfrm rot="1002847" flipV="1">
+            <a:off x="162672" y="1507534"/>
+            <a:ext cx="352440" cy="101880"/>
+          </a:xfrm>
+          <a:custGeom>
+            <a:avLst/>
+            <a:gdLst/>
+            <a:ahLst/>
+            <a:cxnLst/>
+            <a:rect l="l" t="t" r="r" b="b"/>
+            <a:pathLst>
+              <a:path w="21600" h="21600">
+                <a:moveTo>
+                  <a:pt x="0" y="0"/>
+                </a:moveTo>
+                <a:lnTo>
+                  <a:pt x="21600" y="21600"/>
+                </a:lnTo>
+              </a:path>
+            </a:pathLst>
+          </a:custGeom>
+          <a:noFill/>
+          <a:ln w="57150">
+            <a:solidFill>
+              <a:srgbClr val="FF0000"/>
+            </a:solidFill>
+            <a:tailEnd type="triangle" w="med" len="med"/>
+          </a:ln>
+        </p:spPr>
+        <p:style>
+          <a:lnRef idx="3">
+            <a:schemeClr val="accent2"/>
+          </a:lnRef>
+          <a:fillRef idx="0">
+            <a:schemeClr val="accent2"/>
+          </a:fillRef>
+          <a:effectRef idx="2">
+            <a:schemeClr val="accent2"/>
+          </a:effectRef>
+          <a:fontRef idx="minor"/>
+        </p:style>
+      </p:sp>
+      <p:sp>
+        <p:nvSpPr>
+          <p:cNvPr id="68" name="Straight Arrow Connector 4"/>
+          <p:cNvSpPr/>
+          <p:nvPr/>
+        </p:nvSpPr>
+        <p:spPr>
+          <a:xfrm rot="885922" flipV="1">
+            <a:off x="1038215" y="1496733"/>
+            <a:ext cx="472320" cy="123480"/>
+          </a:xfrm>
+          <a:custGeom>
+            <a:avLst/>
+            <a:gdLst/>
+            <a:ahLst/>
+            <a:cxnLst/>
+            <a:rect l="l" t="t" r="r" b="b"/>
+            <a:pathLst>
+              <a:path w="21600" h="21600">
+                <a:moveTo>
+                  <a:pt x="0" y="0"/>
+                </a:moveTo>
+                <a:lnTo>
+                  <a:pt x="21600" y="21600"/>
+                </a:lnTo>
+              </a:path>
+            </a:pathLst>
+          </a:custGeom>
+          <a:noFill/>
+          <a:ln w="57150">
+            <a:solidFill>
+              <a:srgbClr val="FF0000"/>
+            </a:solidFill>
+            <a:headEnd type="triangle" w="med" len="med"/>
+          </a:ln>
+        </p:spPr>
+        <p:style>
+          <a:lnRef idx="3">
+            <a:schemeClr val="accent2"/>
+          </a:lnRef>
+          <a:fillRef idx="0">
+            <a:schemeClr val="accent2"/>
+          </a:fillRef>
+          <a:effectRef idx="2">
+            <a:schemeClr val="accent2"/>
+          </a:effectRef>
+          <a:fontRef idx="minor"/>
+        </p:style>
+      </p:sp>
+      <p:sp>
+        <p:nvSpPr>
+          <p:cNvPr id="69" name="Explosion: 8 Points 5"/>
+          <p:cNvSpPr/>
+          <p:nvPr/>
+        </p:nvSpPr>
+        <p:spPr>
+          <a:xfrm>
+            <a:off x="531678" y="1282860"/>
+            <a:ext cx="489240" cy="567720"/>
+          </a:xfrm>
+          <a:prstGeom prst="irregularSeal1">
+            <a:avLst/>
+          </a:prstGeom>
+          <a:solidFill>
+            <a:srgbClr val="FFC000"/>
+          </a:solidFill>
+          <a:ln>
+            <a:solidFill>
+              <a:srgbClr val="BC8E00"/>
+            </a:solidFill>
+          </a:ln>
+        </p:spPr>
+        <p:style>
+          <a:lnRef idx="2">
+            <a:schemeClr val="accent4">
+              <a:shade val="50000"/>
+            </a:schemeClr>
+          </a:lnRef>
+          <a:fillRef idx="1">
+            <a:schemeClr val="accent4"/>
+          </a:fillRef>
+          <a:effectRef idx="0">
+            <a:schemeClr val="accent4"/>
+          </a:effectRef>
+          <a:fontRef idx="minor"/>
+        </p:style>
+      </p:sp>
+      <p:sp>
+        <p:nvSpPr>
+          <p:cNvPr id="82" name="TextBox 15"/>
+          <p:cNvSpPr/>
+          <p:nvPr/>
+        </p:nvSpPr>
+        <p:spPr>
+          <a:xfrm>
+            <a:off x="579504" y="975015"/>
+            <a:ext cx="394920" cy="364680"/>
+          </a:xfrm>
+          <a:prstGeom prst="rect">
+            <a:avLst/>
+          </a:prstGeom>
+          <a:noFill/>
+          <a:ln w="0">
+            <a:noFill/>
+          </a:ln>
+        </p:spPr>
+        <p:style>
+          <a:lnRef idx="0">
+            <a:scrgbClr r="0" g="0" b="0"/>
+          </a:lnRef>
+          <a:fillRef idx="0">
+            <a:scrgbClr r="0" g="0" b="0"/>
+          </a:fillRef>
+          <a:effectRef idx="0">
+            <a:scrgbClr r="0" g="0" b="0"/>
+          </a:effectRef>
+          <a:fontRef idx="minor"/>
+        </p:style>
+        <p:txBody>
+          <a:bodyPr lIns="90000" tIns="45000" rIns="90000" bIns="45000" anchor="t">
+            <a:spAutoFit/>
+          </a:bodyPr>
+          <a:lstStyle/>
+          <a:p>
+            <a:pPr>
+              <a:lnSpc>
+                <a:spcPct val="100000"/>
+              </a:lnSpc>
+              <a:buNone/>
+            </a:pPr>
+            <a:r>
+              <a:rPr lang="en-US" sz="1800" b="1" strike="noStrike" spc="-1" dirty="0">
+                <a:solidFill>
+                  <a:srgbClr val="000000"/>
+                </a:solidFill>
+                <a:latin typeface="Calibri"/>
+              </a:rPr>
+              <a:t>IP</a:t>
+            </a:r>
+            <a:endParaRPr lang="en-US" sz="1800" b="0" strike="noStrike" spc="-1" dirty="0">
+              <a:latin typeface="Arial"/>
+            </a:endParaRPr>
+          </a:p>
+        </p:txBody>
+      </p:sp>
+      <p:cxnSp>
+        <p:nvCxnSpPr>
+          <p:cNvPr id="3" name="Straight Connector 2">
+            <a:extLst>
+              <a:ext uri="{FF2B5EF4-FFF2-40B4-BE49-F238E27FC236}">
+                <a16:creationId xmlns:a16="http://schemas.microsoft.com/office/drawing/2014/main" id="{401F68D0-39F8-1CD4-272C-7D927DF2825F}"/>
+              </a:ext>
+            </a:extLst>
+          </p:cNvPr>
+          <p:cNvCxnSpPr>
+            <a:cxnSpLocks/>
+          </p:cNvCxnSpPr>
+          <p:nvPr/>
+        </p:nvCxnSpPr>
+        <p:spPr>
+          <a:xfrm>
+            <a:off x="2126160" y="446272"/>
+            <a:ext cx="0" cy="904051"/>
+          </a:xfrm>
+          <a:prstGeom prst="line">
+            <a:avLst/>
+          </a:prstGeom>
+          <a:ln w="57150"/>
+        </p:spPr>
+        <p:style>
+          <a:lnRef idx="1">
+            <a:schemeClr val="dk1"/>
+          </a:lnRef>
+          <a:fillRef idx="0">
+            <a:schemeClr val="dk1"/>
+          </a:fillRef>
+          <a:effectRef idx="0">
+            <a:schemeClr val="dk1"/>
+          </a:effectRef>
+          <a:fontRef idx="minor">
+            <a:schemeClr val="tx1"/>
+          </a:fontRef>
+        </p:style>
+      </p:cxnSp>
+      <p:cxnSp>
+        <p:nvCxnSpPr>
+          <p:cNvPr id="24" name="Straight Connector 23">
+            <a:extLst>
+              <a:ext uri="{FF2B5EF4-FFF2-40B4-BE49-F238E27FC236}">
+                <a16:creationId xmlns:a16="http://schemas.microsoft.com/office/drawing/2014/main" id="{EE72B3D7-27CC-F3F4-A1C5-528F16607A8F}"/>
+              </a:ext>
+            </a:extLst>
+          </p:cNvPr>
+          <p:cNvCxnSpPr>
+            <a:cxnSpLocks/>
+          </p:cNvCxnSpPr>
+          <p:nvPr/>
+        </p:nvCxnSpPr>
+        <p:spPr>
+          <a:xfrm>
+            <a:off x="2457360" y="423629"/>
+            <a:ext cx="0" cy="904051"/>
+          </a:xfrm>
+          <a:prstGeom prst="line">
+            <a:avLst/>
+          </a:prstGeom>
+          <a:ln w="57150"/>
+        </p:spPr>
+        <p:style>
+          <a:lnRef idx="1">
+            <a:schemeClr val="dk1"/>
+          </a:lnRef>
+          <a:fillRef idx="0">
+            <a:schemeClr val="dk1"/>
+          </a:fillRef>
+          <a:effectRef idx="0">
+            <a:schemeClr val="dk1"/>
+          </a:effectRef>
+          <a:fontRef idx="minor">
+            <a:schemeClr val="tx1"/>
+          </a:fontRef>
+        </p:style>
+      </p:cxnSp>
+      <p:sp>
+        <p:nvSpPr>
+          <p:cNvPr id="77" name="Straight Connector 16"/>
+          <p:cNvSpPr/>
+          <p:nvPr/>
+        </p:nvSpPr>
+        <p:spPr>
+          <a:xfrm flipV="1">
+            <a:off x="323130" y="894102"/>
+            <a:ext cx="3157084" cy="6984"/>
+          </a:xfrm>
+          <a:prstGeom prst="line">
+            <a:avLst/>
+          </a:prstGeom>
+          <a:ln w="31750">
+            <a:solidFill>
+              <a:srgbClr val="FF0000"/>
+            </a:solidFill>
+            <a:prstDash val="sysDash"/>
+          </a:ln>
+        </p:spPr>
+        <p:style>
+          <a:lnRef idx="1">
+            <a:schemeClr val="accent1"/>
+          </a:lnRef>
+          <a:fillRef idx="0">
+            <a:schemeClr val="accent1"/>
+          </a:fillRef>
+          <a:effectRef idx="0">
+            <a:schemeClr val="accent1"/>
+          </a:effectRef>
+          <a:fontRef idx="minor"/>
+        </p:style>
+      </p:sp>
+      <p:sp>
+        <p:nvSpPr>
+          <p:cNvPr id="78" name="Star: 5 Points 17"/>
+          <p:cNvSpPr/>
+          <p:nvPr/>
+        </p:nvSpPr>
+        <p:spPr>
+          <a:xfrm>
+            <a:off x="2025656" y="800981"/>
+            <a:ext cx="213840" cy="181800"/>
+          </a:xfrm>
+          <a:prstGeom prst="star5">
+            <a:avLst>
+              <a:gd name="adj" fmla="val 19098"/>
+              <a:gd name="hf" fmla="val 105146"/>
+              <a:gd name="vf" fmla="val 110557"/>
+            </a:avLst>
+          </a:prstGeom>
+          <a:solidFill>
+            <a:srgbClr val="FF0000"/>
+          </a:solidFill>
+          <a:ln w="6350">
+            <a:solidFill>
+              <a:srgbClr val="000000"/>
+            </a:solidFill>
+          </a:ln>
+        </p:spPr>
+        <p:style>
+          <a:lnRef idx="2">
+            <a:schemeClr val="accent1">
+              <a:shade val="50000"/>
+            </a:schemeClr>
+          </a:lnRef>
+          <a:fillRef idx="1">
+            <a:schemeClr val="accent1"/>
+          </a:fillRef>
+          <a:effectRef idx="0">
+            <a:schemeClr val="accent1"/>
+          </a:effectRef>
+          <a:fontRef idx="minor"/>
+        </p:style>
+      </p:sp>
+      <p:cxnSp>
+        <p:nvCxnSpPr>
+          <p:cNvPr id="25" name="Straight Connector 24">
+            <a:extLst>
+              <a:ext uri="{FF2B5EF4-FFF2-40B4-BE49-F238E27FC236}">
+                <a16:creationId xmlns:a16="http://schemas.microsoft.com/office/drawing/2014/main" id="{C59EEBFC-2735-77C0-175F-3EAFCFA5247F}"/>
+              </a:ext>
+            </a:extLst>
+          </p:cNvPr>
+          <p:cNvCxnSpPr>
+            <a:cxnSpLocks/>
+          </p:cNvCxnSpPr>
+          <p:nvPr/>
+        </p:nvCxnSpPr>
+        <p:spPr>
+          <a:xfrm>
+            <a:off x="2788560" y="407776"/>
+            <a:ext cx="0" cy="904051"/>
+          </a:xfrm>
+          <a:prstGeom prst="line">
+            <a:avLst/>
+          </a:prstGeom>
+          <a:ln w="57150"/>
+        </p:spPr>
+        <p:style>
+          <a:lnRef idx="1">
+            <a:schemeClr val="dk1"/>
+          </a:lnRef>
+          <a:fillRef idx="0">
+            <a:schemeClr val="dk1"/>
+          </a:fillRef>
+          <a:effectRef idx="0">
+            <a:schemeClr val="dk1"/>
+          </a:effectRef>
+          <a:fontRef idx="minor">
+            <a:schemeClr val="tx1"/>
+          </a:fontRef>
+        </p:style>
+      </p:cxnSp>
+      <p:sp>
+        <p:nvSpPr>
+          <p:cNvPr id="80" name="Star: 5 Points 19"/>
+          <p:cNvSpPr/>
+          <p:nvPr/>
+        </p:nvSpPr>
+        <p:spPr>
+          <a:xfrm>
+            <a:off x="2355014" y="795598"/>
+            <a:ext cx="213840" cy="181800"/>
+          </a:xfrm>
+          <a:prstGeom prst="star5">
+            <a:avLst>
+              <a:gd name="adj" fmla="val 19098"/>
+              <a:gd name="hf" fmla="val 105146"/>
+              <a:gd name="vf" fmla="val 110557"/>
+            </a:avLst>
+          </a:prstGeom>
+          <a:solidFill>
+            <a:srgbClr val="FF0000"/>
+          </a:solidFill>
+          <a:ln w="6350">
+            <a:solidFill>
+              <a:srgbClr val="000000"/>
+            </a:solidFill>
+          </a:ln>
+        </p:spPr>
+        <p:style>
+          <a:lnRef idx="2">
+            <a:schemeClr val="accent1">
+              <a:shade val="50000"/>
+            </a:schemeClr>
+          </a:lnRef>
+          <a:fillRef idx="1">
+            <a:schemeClr val="accent1"/>
+          </a:fillRef>
+          <a:effectRef idx="0">
+            <a:schemeClr val="accent1"/>
+          </a:effectRef>
+          <a:fontRef idx="minor"/>
+        </p:style>
+      </p:sp>
+      <p:sp>
+        <p:nvSpPr>
+          <p:cNvPr id="73" name="Straight Connector 9"/>
+          <p:cNvSpPr/>
+          <p:nvPr/>
+        </p:nvSpPr>
+        <p:spPr>
+          <a:xfrm flipV="1">
+            <a:off x="776964" y="189296"/>
+            <a:ext cx="2132196" cy="1377423"/>
+          </a:xfrm>
+          <a:prstGeom prst="line">
+            <a:avLst/>
+          </a:prstGeom>
+          <a:ln w="38100">
+            <a:solidFill>
+              <a:srgbClr val="00B050"/>
+            </a:solidFill>
+          </a:ln>
+        </p:spPr>
+        <p:style>
+          <a:lnRef idx="3">
+            <a:schemeClr val="accent1"/>
+          </a:lnRef>
+          <a:fillRef idx="0">
+            <a:schemeClr val="accent1"/>
+          </a:fillRef>
+          <a:effectRef idx="2">
+            <a:schemeClr val="accent1"/>
+          </a:effectRef>
+          <a:fontRef idx="minor"/>
+        </p:style>
+      </p:sp>
+      <p:sp>
+        <p:nvSpPr>
+          <p:cNvPr id="74" name="Star: 5 Points 10"/>
+          <p:cNvSpPr/>
+          <p:nvPr/>
+        </p:nvSpPr>
+        <p:spPr>
+          <a:xfrm>
+            <a:off x="2025656" y="575306"/>
+            <a:ext cx="213840" cy="181800"/>
+          </a:xfrm>
+          <a:prstGeom prst="star5">
+            <a:avLst>
+              <a:gd name="adj" fmla="val 19098"/>
+              <a:gd name="hf" fmla="val 105146"/>
+              <a:gd name="vf" fmla="val 110557"/>
+            </a:avLst>
+          </a:prstGeom>
+          <a:solidFill>
+            <a:srgbClr val="00B050"/>
+          </a:solidFill>
+          <a:ln w="6350">
+            <a:solidFill>
+              <a:srgbClr val="000000"/>
+            </a:solidFill>
+          </a:ln>
+        </p:spPr>
+        <p:style>
+          <a:lnRef idx="2">
+            <a:schemeClr val="accent1">
+              <a:shade val="50000"/>
+            </a:schemeClr>
+          </a:lnRef>
+          <a:fillRef idx="1">
+            <a:schemeClr val="accent1"/>
+          </a:fillRef>
+          <a:effectRef idx="0">
+            <a:schemeClr val="accent1"/>
+          </a:effectRef>
+          <a:fontRef idx="minor"/>
+        </p:style>
+      </p:sp>
+      <p:sp>
+        <p:nvSpPr>
+          <p:cNvPr id="75" name="Star: 5 Points 11"/>
+          <p:cNvSpPr/>
+          <p:nvPr/>
+        </p:nvSpPr>
+        <p:spPr>
+          <a:xfrm>
+            <a:off x="2355014" y="390768"/>
+            <a:ext cx="213840" cy="181800"/>
+          </a:xfrm>
+          <a:prstGeom prst="star5">
+            <a:avLst>
+              <a:gd name="adj" fmla="val 19098"/>
+              <a:gd name="hf" fmla="val 105146"/>
+              <a:gd name="vf" fmla="val 110557"/>
+            </a:avLst>
+          </a:prstGeom>
+          <a:solidFill>
+            <a:srgbClr val="00B050"/>
+          </a:solidFill>
+          <a:ln w="6350">
+            <a:solidFill>
+              <a:srgbClr val="000000"/>
+            </a:solidFill>
+          </a:ln>
+        </p:spPr>
+        <p:style>
+          <a:lnRef idx="2">
+            <a:schemeClr val="accent1">
+              <a:shade val="50000"/>
+            </a:schemeClr>
+          </a:lnRef>
+          <a:fillRef idx="1">
+            <a:schemeClr val="accent1"/>
+          </a:fillRef>
+          <a:effectRef idx="0">
+            <a:schemeClr val="accent1"/>
+          </a:effectRef>
+          <a:fontRef idx="minor"/>
+        </p:style>
+      </p:sp>
+      <p:sp>
+        <p:nvSpPr>
+          <p:cNvPr id="81" name="Straight Connector 14"/>
+          <p:cNvSpPr/>
+          <p:nvPr/>
+        </p:nvSpPr>
+        <p:spPr>
+          <a:xfrm flipV="1">
+            <a:off x="776963" y="1228825"/>
+            <a:ext cx="2684921" cy="337895"/>
+          </a:xfrm>
+          <a:prstGeom prst="line">
+            <a:avLst/>
+          </a:prstGeom>
+          <a:ln w="38100">
+            <a:solidFill>
+              <a:srgbClr val="00B050"/>
+            </a:solidFill>
+          </a:ln>
+        </p:spPr>
+        <p:style>
+          <a:lnRef idx="3">
+            <a:schemeClr val="accent1"/>
+          </a:lnRef>
+          <a:fillRef idx="0">
+            <a:schemeClr val="accent1"/>
+          </a:fillRef>
+          <a:effectRef idx="2">
+            <a:schemeClr val="accent1"/>
+          </a:effectRef>
+          <a:fontRef idx="minor"/>
+        </p:style>
+      </p:sp>
+      <p:sp>
+        <p:nvSpPr>
+          <p:cNvPr id="83" name="Star: 5 Points 12"/>
+          <p:cNvSpPr/>
+          <p:nvPr/>
+        </p:nvSpPr>
+        <p:spPr>
+          <a:xfrm>
+            <a:off x="2684849" y="1212059"/>
+            <a:ext cx="213840" cy="181800"/>
+          </a:xfrm>
+          <a:prstGeom prst="star5">
+            <a:avLst>
+              <a:gd name="adj" fmla="val 19098"/>
+              <a:gd name="hf" fmla="val 105146"/>
+              <a:gd name="vf" fmla="val 110557"/>
+            </a:avLst>
+          </a:prstGeom>
+          <a:solidFill>
+            <a:srgbClr val="00B050"/>
+          </a:solidFill>
+          <a:ln w="6350">
+            <a:solidFill>
+              <a:srgbClr val="000000"/>
+            </a:solidFill>
+          </a:ln>
+        </p:spPr>
+        <p:style>
+          <a:lnRef idx="2">
+            <a:schemeClr val="accent1">
+              <a:shade val="50000"/>
+            </a:schemeClr>
+          </a:lnRef>
+          <a:fillRef idx="1">
+            <a:schemeClr val="accent1"/>
+          </a:fillRef>
+          <a:effectRef idx="0">
+            <a:schemeClr val="accent1"/>
+          </a:effectRef>
+          <a:fontRef idx="minor"/>
+        </p:style>
+      </p:sp>
+      <p:sp>
+        <p:nvSpPr>
+          <p:cNvPr id="79" name="Star: 5 Points 18"/>
+          <p:cNvSpPr/>
+          <p:nvPr/>
+        </p:nvSpPr>
+        <p:spPr>
+          <a:xfrm>
+            <a:off x="2683367" y="798161"/>
+            <a:ext cx="213840" cy="181800"/>
+          </a:xfrm>
+          <a:prstGeom prst="star5">
+            <a:avLst>
+              <a:gd name="adj" fmla="val 19098"/>
+              <a:gd name="hf" fmla="val 105146"/>
+              <a:gd name="vf" fmla="val 110557"/>
+            </a:avLst>
+          </a:prstGeom>
+          <a:solidFill>
+            <a:srgbClr val="FF0000"/>
+          </a:solidFill>
+          <a:ln w="6350">
+            <a:solidFill>
+              <a:srgbClr val="000000"/>
+            </a:solidFill>
+          </a:ln>
+        </p:spPr>
+        <p:style>
+          <a:lnRef idx="2">
+            <a:schemeClr val="accent1">
+              <a:shade val="50000"/>
+            </a:schemeClr>
+          </a:lnRef>
+          <a:fillRef idx="1">
+            <a:schemeClr val="accent1"/>
+          </a:fillRef>
+          <a:effectRef idx="0">
+            <a:schemeClr val="accent1"/>
+          </a:effectRef>
+          <a:fontRef idx="minor"/>
+        </p:style>
+      </p:sp>
+    </p:spTree>
+    <p:extLst>
+      <p:ext uri="{BB962C8B-B14F-4D97-AF65-F5344CB8AC3E}">
+        <p14:creationId xmlns:p14="http://schemas.microsoft.com/office/powerpoint/2010/main" val="1848079663"/>
+      </p:ext>
+    </p:extLst>
+  </p:cSld>
+  <p:clrMapOvr>
+    <a:masterClrMapping/>
+  </p:clrMapOvr>
 </p:sld>
 </file>
 
@@ -4954,34 +6153,34 @@
         <a:sysClr val="window" lastClr="FFFFFF"/>
       </a:lt1>
       <a:dk2>
-        <a:srgbClr val="44546a"/>
+        <a:srgbClr val="44546A"/>
       </a:dk2>
       <a:lt2>
-        <a:srgbClr val="e7e6e6"/>
+        <a:srgbClr val="E7E6E6"/>
       </a:lt2>
       <a:accent1>
-        <a:srgbClr val="4472c4"/>
+        <a:srgbClr val="4472C4"/>
       </a:accent1>
       <a:accent2>
-        <a:srgbClr val="ed7d31"/>
+        <a:srgbClr val="ED7D31"/>
       </a:accent2>
       <a:accent3>
-        <a:srgbClr val="a5a5a5"/>
+        <a:srgbClr val="A5A5A5"/>
       </a:accent3>
       <a:accent4>
-        <a:srgbClr val="ffc000"/>
+        <a:srgbClr val="FFC000"/>
       </a:accent4>
       <a:accent5>
-        <a:srgbClr val="5b9bd5"/>
+        <a:srgbClr val="5B9BD5"/>
       </a:accent5>
       <a:accent6>
-        <a:srgbClr val="70ad47"/>
+        <a:srgbClr val="70AD47"/>
       </a:accent6>
       <a:hlink>
-        <a:srgbClr val="0563c1"/>
+        <a:srgbClr val="0563C1"/>
       </a:hlink>
       <a:folHlink>
-        <a:srgbClr val="954f72"/>
+        <a:srgbClr val="954F72"/>
       </a:folHlink>
     </a:clrScheme>
     <a:fontScheme name="Office">
@@ -5166,5 +6365,7 @@
       </a:bgFillStyleLst>
     </a:fmtScheme>
   </a:themeElements>
+  <a:objectDefaults/>
+  <a:extraClrSchemeLst/>
 </a:theme>
 </file>
</xml_diff>